<commit_message>
Updated Presentation - Section Pedaogical Outcomes (plus added images to Introduction section)
</commit_message>
<xml_diff>
--- a/TeamDocs/WordDocs/Presentation/JelBlob_Presentation_AW.pptx
+++ b/TeamDocs/WordDocs/Presentation/JelBlob_Presentation_AW.pptx
@@ -215,7 +215,7 @@
           <a:p>
             <a:fld id="{9143A75C-4E93-4E57-8FE0-0B5536F2214D}" type="datetimeFigureOut">
               <a:rPr lang="en-US" smtClean="0"/>
-              <a:t>11/11/2017</a:t>
+              <a:t>11/20/2017</a:t>
             </a:fld>
             <a:endParaRPr lang="en-US"/>
           </a:p>
@@ -1482,6 +1482,12 @@
             </a:r>
           </a:p>
           <a:p>
+            <a:r>
+              <a:rPr lang="en-GB" dirty="0"/>
+              <a:t>// Slide Done by Kenny</a:t>
+            </a:r>
+          </a:p>
+          <a:p>
             <a:endParaRPr lang="en-US" dirty="0"/>
           </a:p>
         </p:txBody>
@@ -1584,6 +1590,14 @@
             </a:r>
           </a:p>
           <a:p>
+            <a:r>
+              <a:rPr lang="en-US" dirty="0"/>
+              <a:t>// Slide</a:t>
+            </a:r>
+            <a:r>
+              <a:rPr lang="en-US" baseline="0" dirty="0"/>
+              <a:t> done by Kenny</a:t>
+            </a:r>
             <a:endParaRPr lang="en-US" dirty="0"/>
           </a:p>
         </p:txBody>
@@ -2114,7 +2128,7 @@
           <a:p>
             <a:fld id="{349AB840-55CF-4B95-A905-70A2B172BCA3}" type="datetimeFigureOut">
               <a:rPr lang="en-GB" smtClean="0"/>
-              <a:t>11/11/2017</a:t>
+              <a:t>20/11/2017</a:t>
             </a:fld>
             <a:endParaRPr lang="en-GB"/>
           </a:p>
@@ -2426,7 +2440,7 @@
           <a:p>
             <a:fld id="{349AB840-55CF-4B95-A905-70A2B172BCA3}" type="datetimeFigureOut">
               <a:rPr lang="en-GB" smtClean="0"/>
-              <a:t>11/11/2017</a:t>
+              <a:t>20/11/2017</a:t>
             </a:fld>
             <a:endParaRPr lang="en-GB"/>
           </a:p>
@@ -2648,7 +2662,7 @@
           <a:p>
             <a:fld id="{349AB840-55CF-4B95-A905-70A2B172BCA3}" type="datetimeFigureOut">
               <a:rPr lang="en-GB" smtClean="0"/>
-              <a:t>11/11/2017</a:t>
+              <a:t>20/11/2017</a:t>
             </a:fld>
             <a:endParaRPr lang="en-GB"/>
           </a:p>
@@ -2939,7 +2953,7 @@
           <a:p>
             <a:fld id="{349AB840-55CF-4B95-A905-70A2B172BCA3}" type="datetimeFigureOut">
               <a:rPr lang="en-GB" smtClean="0"/>
-              <a:t>11/11/2017</a:t>
+              <a:t>20/11/2017</a:t>
             </a:fld>
             <a:endParaRPr lang="en-GB"/>
           </a:p>
@@ -3393,7 +3407,7 @@
           <a:p>
             <a:fld id="{349AB840-55CF-4B95-A905-70A2B172BCA3}" type="datetimeFigureOut">
               <a:rPr lang="en-GB" smtClean="0"/>
-              <a:t>11/11/2017</a:t>
+              <a:t>20/11/2017</a:t>
             </a:fld>
             <a:endParaRPr lang="en-GB"/>
           </a:p>
@@ -3969,7 +3983,7 @@
           <a:p>
             <a:fld id="{349AB840-55CF-4B95-A905-70A2B172BCA3}" type="datetimeFigureOut">
               <a:rPr lang="en-GB" smtClean="0"/>
-              <a:t>11/11/2017</a:t>
+              <a:t>20/11/2017</a:t>
             </a:fld>
             <a:endParaRPr lang="en-GB"/>
           </a:p>
@@ -4821,7 +4835,7 @@
           <a:p>
             <a:fld id="{349AB840-55CF-4B95-A905-70A2B172BCA3}" type="datetimeFigureOut">
               <a:rPr lang="en-GB" smtClean="0"/>
-              <a:t>11/11/2017</a:t>
+              <a:t>20/11/2017</a:t>
             </a:fld>
             <a:endParaRPr lang="en-GB"/>
           </a:p>
@@ -5026,7 +5040,7 @@
           <a:p>
             <a:fld id="{349AB840-55CF-4B95-A905-70A2B172BCA3}" type="datetimeFigureOut">
               <a:rPr lang="en-GB" smtClean="0"/>
-              <a:t>11/11/2017</a:t>
+              <a:t>20/11/2017</a:t>
             </a:fld>
             <a:endParaRPr lang="en-GB"/>
           </a:p>
@@ -5240,7 +5254,7 @@
           <a:p>
             <a:fld id="{349AB840-55CF-4B95-A905-70A2B172BCA3}" type="datetimeFigureOut">
               <a:rPr lang="en-GB" smtClean="0"/>
-              <a:t>11/11/2017</a:t>
+              <a:t>20/11/2017</a:t>
             </a:fld>
             <a:endParaRPr lang="en-GB"/>
           </a:p>
@@ -5445,7 +5459,7 @@
           <a:p>
             <a:fld id="{349AB840-55CF-4B95-A905-70A2B172BCA3}" type="datetimeFigureOut">
               <a:rPr lang="en-GB" smtClean="0"/>
-              <a:t>11/11/2017</a:t>
+              <a:t>20/11/2017</a:t>
             </a:fld>
             <a:endParaRPr lang="en-GB"/>
           </a:p>
@@ -5725,7 +5739,7 @@
           <a:p>
             <a:fld id="{349AB840-55CF-4B95-A905-70A2B172BCA3}" type="datetimeFigureOut">
               <a:rPr lang="en-GB" smtClean="0"/>
-              <a:t>11/11/2017</a:t>
+              <a:t>20/11/2017</a:t>
             </a:fld>
             <a:endParaRPr lang="en-GB"/>
           </a:p>
@@ -5992,7 +6006,7 @@
           <a:p>
             <a:fld id="{349AB840-55CF-4B95-A905-70A2B172BCA3}" type="datetimeFigureOut">
               <a:rPr lang="en-GB" smtClean="0"/>
-              <a:t>11/11/2017</a:t>
+              <a:t>20/11/2017</a:t>
             </a:fld>
             <a:endParaRPr lang="en-GB"/>
           </a:p>
@@ -6407,7 +6421,7 @@
           <a:p>
             <a:fld id="{349AB840-55CF-4B95-A905-70A2B172BCA3}" type="datetimeFigureOut">
               <a:rPr lang="en-GB" smtClean="0"/>
-              <a:t>11/11/2017</a:t>
+              <a:t>20/11/2017</a:t>
             </a:fld>
             <a:endParaRPr lang="en-GB"/>
           </a:p>
@@ -6555,7 +6569,7 @@
           <a:p>
             <a:fld id="{349AB840-55CF-4B95-A905-70A2B172BCA3}" type="datetimeFigureOut">
               <a:rPr lang="en-GB" smtClean="0"/>
-              <a:t>11/11/2017</a:t>
+              <a:t>20/11/2017</a:t>
             </a:fld>
             <a:endParaRPr lang="en-GB"/>
           </a:p>
@@ -6680,7 +6694,7 @@
           <a:p>
             <a:fld id="{349AB840-55CF-4B95-A905-70A2B172BCA3}" type="datetimeFigureOut">
               <a:rPr lang="en-GB" smtClean="0"/>
-              <a:t>11/11/2017</a:t>
+              <a:t>20/11/2017</a:t>
             </a:fld>
             <a:endParaRPr lang="en-GB"/>
           </a:p>
@@ -6959,7 +6973,7 @@
           <a:p>
             <a:fld id="{349AB840-55CF-4B95-A905-70A2B172BCA3}" type="datetimeFigureOut">
               <a:rPr lang="en-GB" smtClean="0"/>
-              <a:t>11/11/2017</a:t>
+              <a:t>20/11/2017</a:t>
             </a:fld>
             <a:endParaRPr lang="en-GB"/>
           </a:p>
@@ -7271,7 +7285,7 @@
           <a:p>
             <a:fld id="{349AB840-55CF-4B95-A905-70A2B172BCA3}" type="datetimeFigureOut">
               <a:rPr lang="en-GB" smtClean="0"/>
-              <a:t>11/11/2017</a:t>
+              <a:t>20/11/2017</a:t>
             </a:fld>
             <a:endParaRPr lang="en-GB"/>
           </a:p>
@@ -7524,7 +7538,7 @@
           <a:p>
             <a:fld id="{349AB840-55CF-4B95-A905-70A2B172BCA3}" type="datetimeFigureOut">
               <a:rPr lang="en-GB" smtClean="0"/>
-              <a:t>11/11/2017</a:t>
+              <a:t>20/11/2017</a:t>
             </a:fld>
             <a:endParaRPr lang="en-GB"/>
           </a:p>
@@ -8655,26 +8669,480 @@
       </p:sp>
       <p:sp>
         <p:nvSpPr>
-          <p:cNvPr id="3" name="Content Placeholder 2"/>
-          <p:cNvSpPr>
-            <a:spLocks noGrp="1"/>
-          </p:cNvSpPr>
-          <p:nvPr>
-            <p:ph sz="quarter" idx="13"/>
-          </p:nvPr>
+          <p:cNvPr id="4" name="TextBox 3">
+            <a:extLst>
+              <a:ext uri="{FF2B5EF4-FFF2-40B4-BE49-F238E27FC236}">
+                <a16:creationId xmlns:a16="http://schemas.microsoft.com/office/drawing/2014/main" id="{4DE2D4F4-1953-401E-A4C5-4424E57DC6CF}"/>
+              </a:ext>
+            </a:extLst>
+          </p:cNvPr>
+          <p:cNvSpPr txBox="1"/>
+          <p:nvPr/>
         </p:nvSpPr>
-        <p:spPr/>
+        <p:spPr>
+          <a:xfrm>
+            <a:off x="3403955" y="2214694"/>
+            <a:ext cx="5384089" cy="369332"/>
+          </a:xfrm>
+          <a:prstGeom prst="rect">
+            <a:avLst/>
+          </a:prstGeom>
+        </p:spPr>
+        <p:style>
+          <a:lnRef idx="2">
+            <a:schemeClr val="accent5">
+              <a:shade val="50000"/>
+            </a:schemeClr>
+          </a:lnRef>
+          <a:fillRef idx="1">
+            <a:schemeClr val="accent5"/>
+          </a:fillRef>
+          <a:effectRef idx="0">
+            <a:schemeClr val="accent5"/>
+          </a:effectRef>
+          <a:fontRef idx="minor">
+            <a:schemeClr val="lt1"/>
+          </a:fontRef>
+        </p:style>
         <p:txBody>
-          <a:bodyPr/>
+          <a:bodyPr wrap="square" rtlCol="0">
+            <a:spAutoFit/>
+          </a:bodyPr>
           <a:lstStyle/>
           <a:p>
+            <a:pPr algn="ctr"/>
             <a:r>
               <a:rPr lang="en-GB" dirty="0"/>
-              <a:t>[Talk about what the team has learnt during the course of the project]</a:t>
-            </a:r>
+              <a:t>The importance of </a:t>
+            </a:r>
+            <a:r>
+              <a:rPr lang="en-GB" b="1" dirty="0"/>
+              <a:t>Communication</a:t>
+            </a:r>
+            <a:r>
+              <a:rPr lang="en-GB" dirty="0"/>
+              <a:t> and </a:t>
+            </a:r>
+            <a:r>
+              <a:rPr lang="en-GB" b="1" dirty="0"/>
+              <a:t>Teamwork</a:t>
+            </a:r>
+            <a:endParaRPr lang="en-US" b="1" dirty="0"/>
           </a:p>
         </p:txBody>
       </p:sp>
+      <p:sp>
+        <p:nvSpPr>
+          <p:cNvPr id="5" name="TextBox 4">
+            <a:extLst>
+              <a:ext uri="{FF2B5EF4-FFF2-40B4-BE49-F238E27FC236}">
+                <a16:creationId xmlns:a16="http://schemas.microsoft.com/office/drawing/2014/main" id="{9F8555E8-4D99-45CD-92D9-751F7DA03C69}"/>
+              </a:ext>
+            </a:extLst>
+          </p:cNvPr>
+          <p:cNvSpPr txBox="1"/>
+          <p:nvPr/>
+        </p:nvSpPr>
+        <p:spPr>
+          <a:xfrm>
+            <a:off x="2809275" y="2686336"/>
+            <a:ext cx="6573448" cy="646331"/>
+          </a:xfrm>
+          <a:prstGeom prst="rect">
+            <a:avLst/>
+          </a:prstGeom>
+        </p:spPr>
+        <p:style>
+          <a:lnRef idx="2">
+            <a:schemeClr val="accent4">
+              <a:shade val="50000"/>
+            </a:schemeClr>
+          </a:lnRef>
+          <a:fillRef idx="1">
+            <a:schemeClr val="accent4"/>
+          </a:fillRef>
+          <a:effectRef idx="0">
+            <a:schemeClr val="accent4"/>
+          </a:effectRef>
+          <a:fontRef idx="minor">
+            <a:schemeClr val="lt1"/>
+          </a:fontRef>
+        </p:style>
+        <p:txBody>
+          <a:bodyPr wrap="square" rtlCol="0">
+            <a:spAutoFit/>
+          </a:bodyPr>
+          <a:lstStyle/>
+          <a:p>
+            <a:pPr algn="ctr"/>
+            <a:r>
+              <a:rPr lang="en-GB" dirty="0"/>
+              <a:t>Gained </a:t>
+            </a:r>
+            <a:r>
+              <a:rPr lang="en-GB" b="1" dirty="0"/>
+              <a:t>experience using</a:t>
+            </a:r>
+            <a:r>
+              <a:rPr lang="en-GB" dirty="0"/>
+              <a:t> different software's and </a:t>
+            </a:r>
+            <a:r>
+              <a:rPr lang="en-GB" b="1" dirty="0"/>
+              <a:t>implementing</a:t>
+            </a:r>
+            <a:r>
+              <a:rPr lang="en-GB" dirty="0"/>
+              <a:t> their different uses.</a:t>
+            </a:r>
+            <a:endParaRPr lang="en-US" dirty="0"/>
+          </a:p>
+        </p:txBody>
+      </p:sp>
+      <p:sp>
+        <p:nvSpPr>
+          <p:cNvPr id="6" name="TextBox 5">
+            <a:extLst>
+              <a:ext uri="{FF2B5EF4-FFF2-40B4-BE49-F238E27FC236}">
+                <a16:creationId xmlns:a16="http://schemas.microsoft.com/office/drawing/2014/main" id="{23A249B5-3AEC-4DB6-B81E-F259FD4B4C32}"/>
+              </a:ext>
+            </a:extLst>
+          </p:cNvPr>
+          <p:cNvSpPr txBox="1"/>
+          <p:nvPr/>
+        </p:nvSpPr>
+        <p:spPr>
+          <a:xfrm>
+            <a:off x="2161308" y="3434977"/>
+            <a:ext cx="7903485" cy="646331"/>
+          </a:xfrm>
+          <a:prstGeom prst="rect">
+            <a:avLst/>
+          </a:prstGeom>
+        </p:spPr>
+        <p:style>
+          <a:lnRef idx="2">
+            <a:schemeClr val="accent3">
+              <a:shade val="50000"/>
+            </a:schemeClr>
+          </a:lnRef>
+          <a:fillRef idx="1">
+            <a:schemeClr val="accent3"/>
+          </a:fillRef>
+          <a:effectRef idx="0">
+            <a:schemeClr val="accent3"/>
+          </a:effectRef>
+          <a:fontRef idx="minor">
+            <a:schemeClr val="lt1"/>
+          </a:fontRef>
+        </p:style>
+        <p:txBody>
+          <a:bodyPr wrap="square" rtlCol="0">
+            <a:spAutoFit/>
+          </a:bodyPr>
+          <a:lstStyle/>
+          <a:p>
+            <a:pPr algn="ctr"/>
+            <a:r>
+              <a:rPr lang="en-GB" dirty="0"/>
+              <a:t>Creating an </a:t>
+            </a:r>
+            <a:r>
+              <a:rPr lang="en-GB" b="1" dirty="0"/>
+              <a:t>organization of files and assets</a:t>
+            </a:r>
+            <a:r>
+              <a:rPr lang="en-GB" dirty="0"/>
+              <a:t> to which a group can get access to and upload / replace.</a:t>
+            </a:r>
+            <a:endParaRPr lang="en-US" dirty="0"/>
+          </a:p>
+        </p:txBody>
+      </p:sp>
+      <p:sp>
+        <p:nvSpPr>
+          <p:cNvPr id="7" name="TextBox 6">
+            <a:extLst>
+              <a:ext uri="{FF2B5EF4-FFF2-40B4-BE49-F238E27FC236}">
+                <a16:creationId xmlns:a16="http://schemas.microsoft.com/office/drawing/2014/main" id="{A2A7683E-7904-45DB-B4C1-DCF4BD281846}"/>
+              </a:ext>
+            </a:extLst>
+          </p:cNvPr>
+          <p:cNvSpPr txBox="1"/>
+          <p:nvPr/>
+        </p:nvSpPr>
+        <p:spPr>
+          <a:xfrm>
+            <a:off x="1355614" y="4207519"/>
+            <a:ext cx="9610792" cy="369332"/>
+          </a:xfrm>
+          <a:prstGeom prst="rect">
+            <a:avLst/>
+          </a:prstGeom>
+        </p:spPr>
+        <p:style>
+          <a:lnRef idx="2">
+            <a:schemeClr val="accent2">
+              <a:shade val="50000"/>
+            </a:schemeClr>
+          </a:lnRef>
+          <a:fillRef idx="1">
+            <a:schemeClr val="accent2"/>
+          </a:fillRef>
+          <a:effectRef idx="0">
+            <a:schemeClr val="accent2"/>
+          </a:effectRef>
+          <a:fontRef idx="minor">
+            <a:schemeClr val="lt1"/>
+          </a:fontRef>
+        </p:style>
+        <p:txBody>
+          <a:bodyPr wrap="square" rtlCol="0">
+            <a:spAutoFit/>
+          </a:bodyPr>
+          <a:lstStyle/>
+          <a:p>
+            <a:pPr algn="ctr"/>
+            <a:r>
+              <a:rPr lang="en-GB" dirty="0"/>
+              <a:t>The appeal of </a:t>
+            </a:r>
+            <a:r>
+              <a:rPr lang="en-GB" b="1" dirty="0"/>
+              <a:t>Games Design</a:t>
+            </a:r>
+            <a:r>
+              <a:rPr lang="en-GB" dirty="0"/>
+              <a:t>; how to create an </a:t>
+            </a:r>
+            <a:r>
+              <a:rPr lang="en-GB" b="1" dirty="0"/>
+              <a:t>enjoyable experience for players</a:t>
+            </a:r>
+            <a:r>
+              <a:rPr lang="en-GB" dirty="0"/>
+              <a:t>.</a:t>
+            </a:r>
+            <a:endParaRPr lang="en-US" dirty="0"/>
+          </a:p>
+        </p:txBody>
+      </p:sp>
+      <p:pic>
+        <p:nvPicPr>
+          <p:cNvPr id="9" name="Picture 8">
+            <a:extLst>
+              <a:ext uri="{FF2B5EF4-FFF2-40B4-BE49-F238E27FC236}">
+                <a16:creationId xmlns:a16="http://schemas.microsoft.com/office/drawing/2014/main" id="{C8AC4472-50F8-485E-91E4-3B1020671168}"/>
+              </a:ext>
+            </a:extLst>
+          </p:cNvPr>
+          <p:cNvPicPr>
+            <a:picLocks noChangeAspect="1"/>
+          </p:cNvPicPr>
+          <p:nvPr/>
+        </p:nvPicPr>
+        <p:blipFill>
+          <a:blip r:embed="rId3" cstate="print">
+            <a:extLst>
+              <a:ext uri="{28A0092B-C50C-407E-A947-70E740481C1C}">
+                <a14:useLocalDpi xmlns:a14="http://schemas.microsoft.com/office/drawing/2010/main" val="0"/>
+              </a:ext>
+            </a:extLst>
+          </a:blip>
+          <a:stretch>
+            <a:fillRect/>
+          </a:stretch>
+        </p:blipFill>
+        <p:spPr>
+          <a:xfrm>
+            <a:off x="10228917" y="4576851"/>
+            <a:ext cx="1963083" cy="1963083"/>
+          </a:xfrm>
+          <a:prstGeom prst="rect">
+            <a:avLst/>
+          </a:prstGeom>
+        </p:spPr>
+      </p:pic>
+      <p:pic>
+        <p:nvPicPr>
+          <p:cNvPr id="10" name="Picture 9">
+            <a:extLst>
+              <a:ext uri="{FF2B5EF4-FFF2-40B4-BE49-F238E27FC236}">
+                <a16:creationId xmlns:a16="http://schemas.microsoft.com/office/drawing/2014/main" id="{25EE11AA-82FE-45B0-978F-D2D493F7B0A1}"/>
+              </a:ext>
+            </a:extLst>
+          </p:cNvPr>
+          <p:cNvPicPr>
+            <a:picLocks noChangeAspect="1"/>
+          </p:cNvPicPr>
+          <p:nvPr/>
+        </p:nvPicPr>
+        <p:blipFill>
+          <a:blip r:embed="rId3" cstate="print">
+            <a:extLst>
+              <a:ext uri="{28A0092B-C50C-407E-A947-70E740481C1C}">
+                <a14:useLocalDpi xmlns:a14="http://schemas.microsoft.com/office/drawing/2010/main" val="0"/>
+              </a:ext>
+            </a:extLst>
+          </a:blip>
+          <a:stretch>
+            <a:fillRect/>
+          </a:stretch>
+        </p:blipFill>
+        <p:spPr>
+          <a:xfrm>
+            <a:off x="8265834" y="4576850"/>
+            <a:ext cx="1963083" cy="1963083"/>
+          </a:xfrm>
+          <a:prstGeom prst="rect">
+            <a:avLst/>
+          </a:prstGeom>
+        </p:spPr>
+      </p:pic>
+      <p:pic>
+        <p:nvPicPr>
+          <p:cNvPr id="11" name="Picture 10">
+            <a:extLst>
+              <a:ext uri="{FF2B5EF4-FFF2-40B4-BE49-F238E27FC236}">
+                <a16:creationId xmlns:a16="http://schemas.microsoft.com/office/drawing/2014/main" id="{A977369C-0FA9-4102-88DD-B04FEB4A8316}"/>
+              </a:ext>
+            </a:extLst>
+          </p:cNvPr>
+          <p:cNvPicPr>
+            <a:picLocks noChangeAspect="1"/>
+          </p:cNvPicPr>
+          <p:nvPr/>
+        </p:nvPicPr>
+        <p:blipFill>
+          <a:blip r:embed="rId3" cstate="print">
+            <a:extLst>
+              <a:ext uri="{28A0092B-C50C-407E-A947-70E740481C1C}">
+                <a14:useLocalDpi xmlns:a14="http://schemas.microsoft.com/office/drawing/2010/main" val="0"/>
+              </a:ext>
+            </a:extLst>
+          </a:blip>
+          <a:stretch>
+            <a:fillRect/>
+          </a:stretch>
+        </p:blipFill>
+        <p:spPr>
+          <a:xfrm>
+            <a:off x="6302751" y="4576850"/>
+            <a:ext cx="1963083" cy="1963083"/>
+          </a:xfrm>
+          <a:prstGeom prst="rect">
+            <a:avLst/>
+          </a:prstGeom>
+        </p:spPr>
+      </p:pic>
+      <p:pic>
+        <p:nvPicPr>
+          <p:cNvPr id="12" name="Picture 11">
+            <a:extLst>
+              <a:ext uri="{FF2B5EF4-FFF2-40B4-BE49-F238E27FC236}">
+                <a16:creationId xmlns:a16="http://schemas.microsoft.com/office/drawing/2014/main" id="{D3B49769-1C4F-41E2-A898-7BA71F9C3F50}"/>
+              </a:ext>
+            </a:extLst>
+          </p:cNvPr>
+          <p:cNvPicPr>
+            <a:picLocks noChangeAspect="1"/>
+          </p:cNvPicPr>
+          <p:nvPr/>
+        </p:nvPicPr>
+        <p:blipFill>
+          <a:blip r:embed="rId3" cstate="print">
+            <a:extLst>
+              <a:ext uri="{28A0092B-C50C-407E-A947-70E740481C1C}">
+                <a14:useLocalDpi xmlns:a14="http://schemas.microsoft.com/office/drawing/2010/main" val="0"/>
+              </a:ext>
+            </a:extLst>
+          </a:blip>
+          <a:stretch>
+            <a:fillRect/>
+          </a:stretch>
+        </p:blipFill>
+        <p:spPr>
+          <a:xfrm>
+            <a:off x="4339668" y="4576850"/>
+            <a:ext cx="1963083" cy="1963083"/>
+          </a:xfrm>
+          <a:prstGeom prst="rect">
+            <a:avLst/>
+          </a:prstGeom>
+        </p:spPr>
+      </p:pic>
+      <p:pic>
+        <p:nvPicPr>
+          <p:cNvPr id="15" name="Picture 14">
+            <a:extLst>
+              <a:ext uri="{FF2B5EF4-FFF2-40B4-BE49-F238E27FC236}">
+                <a16:creationId xmlns:a16="http://schemas.microsoft.com/office/drawing/2014/main" id="{89988AD0-323E-4BCF-9F7A-C789FC678983}"/>
+              </a:ext>
+            </a:extLst>
+          </p:cNvPr>
+          <p:cNvPicPr>
+            <a:picLocks noChangeAspect="1"/>
+          </p:cNvPicPr>
+          <p:nvPr/>
+        </p:nvPicPr>
+        <p:blipFill>
+          <a:blip r:embed="rId3" cstate="print">
+            <a:extLst>
+              <a:ext uri="{28A0092B-C50C-407E-A947-70E740481C1C}">
+                <a14:useLocalDpi xmlns:a14="http://schemas.microsoft.com/office/drawing/2010/main" val="0"/>
+              </a:ext>
+            </a:extLst>
+          </a:blip>
+          <a:stretch>
+            <a:fillRect/>
+          </a:stretch>
+        </p:blipFill>
+        <p:spPr>
+          <a:xfrm>
+            <a:off x="2376585" y="4576850"/>
+            <a:ext cx="1963083" cy="1963083"/>
+          </a:xfrm>
+          <a:prstGeom prst="rect">
+            <a:avLst/>
+          </a:prstGeom>
+        </p:spPr>
+      </p:pic>
+      <p:pic>
+        <p:nvPicPr>
+          <p:cNvPr id="18" name="Picture 17">
+            <a:extLst>
+              <a:ext uri="{FF2B5EF4-FFF2-40B4-BE49-F238E27FC236}">
+                <a16:creationId xmlns:a16="http://schemas.microsoft.com/office/drawing/2014/main" id="{87E65F5B-FB9A-4C8D-8695-674FF982F83B}"/>
+              </a:ext>
+            </a:extLst>
+          </p:cNvPr>
+          <p:cNvPicPr>
+            <a:picLocks noChangeAspect="1"/>
+          </p:cNvPicPr>
+          <p:nvPr/>
+        </p:nvPicPr>
+        <p:blipFill>
+          <a:blip r:embed="rId4" cstate="print">
+            <a:extLst>
+              <a:ext uri="{28A0092B-C50C-407E-A947-70E740481C1C}">
+                <a14:useLocalDpi xmlns:a14="http://schemas.microsoft.com/office/drawing/2010/main" val="0"/>
+              </a:ext>
+            </a:extLst>
+          </a:blip>
+          <a:stretch>
+            <a:fillRect/>
+          </a:stretch>
+        </p:blipFill>
+        <p:spPr>
+          <a:xfrm>
+            <a:off x="444692" y="4576850"/>
+            <a:ext cx="1931893" cy="1931893"/>
+          </a:xfrm>
+          <a:prstGeom prst="rect">
+            <a:avLst/>
+          </a:prstGeom>
+        </p:spPr>
+      </p:pic>
     </p:spTree>
     <p:extLst>
       <p:ext uri="{BB962C8B-B14F-4D97-AF65-F5344CB8AC3E}">
@@ -8697,6 +9165,406 @@
       </p:transition>
     </mc:Fallback>
   </mc:AlternateContent>
+  <p:timing>
+    <p:tnLst>
+      <p:par>
+        <p:cTn id="1" dur="indefinite" restart="never" nodeType="tmRoot">
+          <p:childTnLst>
+            <p:seq concurrent="1" nextAc="seek">
+              <p:cTn id="2" dur="indefinite" nodeType="mainSeq">
+                <p:childTnLst>
+                  <p:par>
+                    <p:cTn id="3" fill="hold">
+                      <p:stCondLst>
+                        <p:cond delay="indefinite"/>
+                      </p:stCondLst>
+                      <p:childTnLst>
+                        <p:par>
+                          <p:cTn id="4" fill="hold">
+                            <p:stCondLst>
+                              <p:cond delay="0"/>
+                            </p:stCondLst>
+                            <p:childTnLst>
+                              <p:par>
+                                <p:cTn id="5" presetID="2" presetClass="entr" presetSubtype="4" fill="hold" grpId="0" nodeType="clickEffect">
+                                  <p:stCondLst>
+                                    <p:cond delay="0"/>
+                                  </p:stCondLst>
+                                  <p:childTnLst>
+                                    <p:set>
+                                      <p:cBhvr>
+                                        <p:cTn id="6" dur="1" fill="hold">
+                                          <p:stCondLst>
+                                            <p:cond delay="0"/>
+                                          </p:stCondLst>
+                                        </p:cTn>
+                                        <p:tgtEl>
+                                          <p:spTgt spid="7"/>
+                                        </p:tgtEl>
+                                        <p:attrNameLst>
+                                          <p:attrName>style.visibility</p:attrName>
+                                        </p:attrNameLst>
+                                      </p:cBhvr>
+                                      <p:to>
+                                        <p:strVal val="visible"/>
+                                      </p:to>
+                                    </p:set>
+                                    <p:anim calcmode="lin" valueType="num">
+                                      <p:cBhvr additive="base">
+                                        <p:cTn id="7" dur="500" fill="hold"/>
+                                        <p:tgtEl>
+                                          <p:spTgt spid="7"/>
+                                        </p:tgtEl>
+                                        <p:attrNameLst>
+                                          <p:attrName>ppt_x</p:attrName>
+                                        </p:attrNameLst>
+                                      </p:cBhvr>
+                                      <p:tavLst>
+                                        <p:tav tm="0">
+                                          <p:val>
+                                            <p:strVal val="#ppt_x"/>
+                                          </p:val>
+                                        </p:tav>
+                                        <p:tav tm="100000">
+                                          <p:val>
+                                            <p:strVal val="#ppt_x"/>
+                                          </p:val>
+                                        </p:tav>
+                                      </p:tavLst>
+                                    </p:anim>
+                                    <p:anim calcmode="lin" valueType="num">
+                                      <p:cBhvr additive="base">
+                                        <p:cTn id="8" dur="500" fill="hold"/>
+                                        <p:tgtEl>
+                                          <p:spTgt spid="7"/>
+                                        </p:tgtEl>
+                                        <p:attrNameLst>
+                                          <p:attrName>ppt_y</p:attrName>
+                                        </p:attrNameLst>
+                                      </p:cBhvr>
+                                      <p:tavLst>
+                                        <p:tav tm="0">
+                                          <p:val>
+                                            <p:strVal val="1+#ppt_h/2"/>
+                                          </p:val>
+                                        </p:tav>
+                                        <p:tav tm="100000">
+                                          <p:val>
+                                            <p:strVal val="#ppt_y"/>
+                                          </p:val>
+                                        </p:tav>
+                                      </p:tavLst>
+                                    </p:anim>
+                                  </p:childTnLst>
+                                </p:cTn>
+                              </p:par>
+                            </p:childTnLst>
+                          </p:cTn>
+                        </p:par>
+                      </p:childTnLst>
+                    </p:cTn>
+                  </p:par>
+                  <p:par>
+                    <p:cTn id="9" fill="hold">
+                      <p:stCondLst>
+                        <p:cond delay="indefinite"/>
+                      </p:stCondLst>
+                      <p:childTnLst>
+                        <p:par>
+                          <p:cTn id="10" fill="hold">
+                            <p:stCondLst>
+                              <p:cond delay="0"/>
+                            </p:stCondLst>
+                            <p:childTnLst>
+                              <p:par>
+                                <p:cTn id="11" presetID="2" presetClass="entr" presetSubtype="4" fill="hold" grpId="0" nodeType="clickEffect">
+                                  <p:stCondLst>
+                                    <p:cond delay="0"/>
+                                  </p:stCondLst>
+                                  <p:childTnLst>
+                                    <p:set>
+                                      <p:cBhvr>
+                                        <p:cTn id="12" dur="1" fill="hold">
+                                          <p:stCondLst>
+                                            <p:cond delay="0"/>
+                                          </p:stCondLst>
+                                        </p:cTn>
+                                        <p:tgtEl>
+                                          <p:spTgt spid="6"/>
+                                        </p:tgtEl>
+                                        <p:attrNameLst>
+                                          <p:attrName>style.visibility</p:attrName>
+                                        </p:attrNameLst>
+                                      </p:cBhvr>
+                                      <p:to>
+                                        <p:strVal val="visible"/>
+                                      </p:to>
+                                    </p:set>
+                                    <p:anim calcmode="lin" valueType="num">
+                                      <p:cBhvr additive="base">
+                                        <p:cTn id="13" dur="500" fill="hold"/>
+                                        <p:tgtEl>
+                                          <p:spTgt spid="6"/>
+                                        </p:tgtEl>
+                                        <p:attrNameLst>
+                                          <p:attrName>ppt_x</p:attrName>
+                                        </p:attrNameLst>
+                                      </p:cBhvr>
+                                      <p:tavLst>
+                                        <p:tav tm="0">
+                                          <p:val>
+                                            <p:strVal val="#ppt_x"/>
+                                          </p:val>
+                                        </p:tav>
+                                        <p:tav tm="100000">
+                                          <p:val>
+                                            <p:strVal val="#ppt_x"/>
+                                          </p:val>
+                                        </p:tav>
+                                      </p:tavLst>
+                                    </p:anim>
+                                    <p:anim calcmode="lin" valueType="num">
+                                      <p:cBhvr additive="base">
+                                        <p:cTn id="14" dur="500" fill="hold"/>
+                                        <p:tgtEl>
+                                          <p:spTgt spid="6"/>
+                                        </p:tgtEl>
+                                        <p:attrNameLst>
+                                          <p:attrName>ppt_y</p:attrName>
+                                        </p:attrNameLst>
+                                      </p:cBhvr>
+                                      <p:tavLst>
+                                        <p:tav tm="0">
+                                          <p:val>
+                                            <p:strVal val="1+#ppt_h/2"/>
+                                          </p:val>
+                                        </p:tav>
+                                        <p:tav tm="100000">
+                                          <p:val>
+                                            <p:strVal val="#ppt_y"/>
+                                          </p:val>
+                                        </p:tav>
+                                      </p:tavLst>
+                                    </p:anim>
+                                  </p:childTnLst>
+                                </p:cTn>
+                              </p:par>
+                            </p:childTnLst>
+                          </p:cTn>
+                        </p:par>
+                      </p:childTnLst>
+                    </p:cTn>
+                  </p:par>
+                  <p:par>
+                    <p:cTn id="15" fill="hold">
+                      <p:stCondLst>
+                        <p:cond delay="indefinite"/>
+                      </p:stCondLst>
+                      <p:childTnLst>
+                        <p:par>
+                          <p:cTn id="16" fill="hold">
+                            <p:stCondLst>
+                              <p:cond delay="0"/>
+                            </p:stCondLst>
+                            <p:childTnLst>
+                              <p:par>
+                                <p:cTn id="17" presetID="2" presetClass="entr" presetSubtype="4" fill="hold" grpId="0" nodeType="clickEffect">
+                                  <p:stCondLst>
+                                    <p:cond delay="0"/>
+                                  </p:stCondLst>
+                                  <p:childTnLst>
+                                    <p:set>
+                                      <p:cBhvr>
+                                        <p:cTn id="18" dur="1" fill="hold">
+                                          <p:stCondLst>
+                                            <p:cond delay="0"/>
+                                          </p:stCondLst>
+                                        </p:cTn>
+                                        <p:tgtEl>
+                                          <p:spTgt spid="5"/>
+                                        </p:tgtEl>
+                                        <p:attrNameLst>
+                                          <p:attrName>style.visibility</p:attrName>
+                                        </p:attrNameLst>
+                                      </p:cBhvr>
+                                      <p:to>
+                                        <p:strVal val="visible"/>
+                                      </p:to>
+                                    </p:set>
+                                    <p:anim calcmode="lin" valueType="num">
+                                      <p:cBhvr additive="base">
+                                        <p:cTn id="19" dur="500" fill="hold"/>
+                                        <p:tgtEl>
+                                          <p:spTgt spid="5"/>
+                                        </p:tgtEl>
+                                        <p:attrNameLst>
+                                          <p:attrName>ppt_x</p:attrName>
+                                        </p:attrNameLst>
+                                      </p:cBhvr>
+                                      <p:tavLst>
+                                        <p:tav tm="0">
+                                          <p:val>
+                                            <p:strVal val="#ppt_x"/>
+                                          </p:val>
+                                        </p:tav>
+                                        <p:tav tm="100000">
+                                          <p:val>
+                                            <p:strVal val="#ppt_x"/>
+                                          </p:val>
+                                        </p:tav>
+                                      </p:tavLst>
+                                    </p:anim>
+                                    <p:anim calcmode="lin" valueType="num">
+                                      <p:cBhvr additive="base">
+                                        <p:cTn id="20" dur="500" fill="hold"/>
+                                        <p:tgtEl>
+                                          <p:spTgt spid="5"/>
+                                        </p:tgtEl>
+                                        <p:attrNameLst>
+                                          <p:attrName>ppt_y</p:attrName>
+                                        </p:attrNameLst>
+                                      </p:cBhvr>
+                                      <p:tavLst>
+                                        <p:tav tm="0">
+                                          <p:val>
+                                            <p:strVal val="1+#ppt_h/2"/>
+                                          </p:val>
+                                        </p:tav>
+                                        <p:tav tm="100000">
+                                          <p:val>
+                                            <p:strVal val="#ppt_y"/>
+                                          </p:val>
+                                        </p:tav>
+                                      </p:tavLst>
+                                    </p:anim>
+                                  </p:childTnLst>
+                                </p:cTn>
+                              </p:par>
+                            </p:childTnLst>
+                          </p:cTn>
+                        </p:par>
+                      </p:childTnLst>
+                    </p:cTn>
+                  </p:par>
+                  <p:par>
+                    <p:cTn id="21" fill="hold">
+                      <p:stCondLst>
+                        <p:cond delay="indefinite"/>
+                      </p:stCondLst>
+                      <p:childTnLst>
+                        <p:par>
+                          <p:cTn id="22" fill="hold">
+                            <p:stCondLst>
+                              <p:cond delay="0"/>
+                            </p:stCondLst>
+                            <p:childTnLst>
+                              <p:par>
+                                <p:cTn id="23" presetID="2" presetClass="entr" presetSubtype="4" fill="hold" grpId="0" nodeType="clickEffect">
+                                  <p:stCondLst>
+                                    <p:cond delay="0"/>
+                                  </p:stCondLst>
+                                  <p:childTnLst>
+                                    <p:set>
+                                      <p:cBhvr>
+                                        <p:cTn id="24" dur="1" fill="hold">
+                                          <p:stCondLst>
+                                            <p:cond delay="0"/>
+                                          </p:stCondLst>
+                                        </p:cTn>
+                                        <p:tgtEl>
+                                          <p:spTgt spid="4"/>
+                                        </p:tgtEl>
+                                        <p:attrNameLst>
+                                          <p:attrName>style.visibility</p:attrName>
+                                        </p:attrNameLst>
+                                      </p:cBhvr>
+                                      <p:to>
+                                        <p:strVal val="visible"/>
+                                      </p:to>
+                                    </p:set>
+                                    <p:anim calcmode="lin" valueType="num">
+                                      <p:cBhvr additive="base">
+                                        <p:cTn id="25" dur="500" fill="hold"/>
+                                        <p:tgtEl>
+                                          <p:spTgt spid="4"/>
+                                        </p:tgtEl>
+                                        <p:attrNameLst>
+                                          <p:attrName>ppt_x</p:attrName>
+                                        </p:attrNameLst>
+                                      </p:cBhvr>
+                                      <p:tavLst>
+                                        <p:tav tm="0">
+                                          <p:val>
+                                            <p:strVal val="#ppt_x"/>
+                                          </p:val>
+                                        </p:tav>
+                                        <p:tav tm="100000">
+                                          <p:val>
+                                            <p:strVal val="#ppt_x"/>
+                                          </p:val>
+                                        </p:tav>
+                                      </p:tavLst>
+                                    </p:anim>
+                                    <p:anim calcmode="lin" valueType="num">
+                                      <p:cBhvr additive="base">
+                                        <p:cTn id="26" dur="500" fill="hold"/>
+                                        <p:tgtEl>
+                                          <p:spTgt spid="4"/>
+                                        </p:tgtEl>
+                                        <p:attrNameLst>
+                                          <p:attrName>ppt_y</p:attrName>
+                                        </p:attrNameLst>
+                                      </p:cBhvr>
+                                      <p:tavLst>
+                                        <p:tav tm="0">
+                                          <p:val>
+                                            <p:strVal val="1+#ppt_h/2"/>
+                                          </p:val>
+                                        </p:tav>
+                                        <p:tav tm="100000">
+                                          <p:val>
+                                            <p:strVal val="#ppt_y"/>
+                                          </p:val>
+                                        </p:tav>
+                                      </p:tavLst>
+                                    </p:anim>
+                                  </p:childTnLst>
+                                </p:cTn>
+                              </p:par>
+                            </p:childTnLst>
+                          </p:cTn>
+                        </p:par>
+                      </p:childTnLst>
+                    </p:cTn>
+                  </p:par>
+                </p:childTnLst>
+              </p:cTn>
+              <p:prevCondLst>
+                <p:cond evt="onPrev" delay="0">
+                  <p:tgtEl>
+                    <p:sldTgt/>
+                  </p:tgtEl>
+                </p:cond>
+              </p:prevCondLst>
+              <p:nextCondLst>
+                <p:cond evt="onNext" delay="0">
+                  <p:tgtEl>
+                    <p:sldTgt/>
+                  </p:tgtEl>
+                </p:cond>
+              </p:nextCondLst>
+            </p:seq>
+          </p:childTnLst>
+        </p:cTn>
+      </p:par>
+    </p:tnLst>
+    <p:bldLst>
+      <p:bldP spid="4" grpId="0" animBg="1"/>
+      <p:bldP spid="5" grpId="0" animBg="1"/>
+      <p:bldP spid="6" grpId="0" animBg="1"/>
+      <p:bldP spid="7" grpId="0" animBg="1"/>
+    </p:bldLst>
+  </p:timing>
 </p:sld>
 </file>
 
@@ -10679,6 +11547,78 @@
           <a:xfrm>
             <a:off x="4080123" y="3800579"/>
             <a:ext cx="3905297" cy="1952649"/>
+          </a:xfrm>
+          <a:prstGeom prst="rect">
+            <a:avLst/>
+          </a:prstGeom>
+        </p:spPr>
+      </p:pic>
+      <p:pic>
+        <p:nvPicPr>
+          <p:cNvPr id="4" name="Picture 3">
+            <a:extLst>
+              <a:ext uri="{FF2B5EF4-FFF2-40B4-BE49-F238E27FC236}">
+                <a16:creationId xmlns:a16="http://schemas.microsoft.com/office/drawing/2014/main" id="{06860622-13EF-4BBE-889D-DCD2479648C6}"/>
+              </a:ext>
+            </a:extLst>
+          </p:cNvPr>
+          <p:cNvPicPr>
+            <a:picLocks noChangeAspect="1"/>
+          </p:cNvPicPr>
+          <p:nvPr/>
+        </p:nvPicPr>
+        <p:blipFill>
+          <a:blip r:embed="rId10" cstate="print">
+            <a:extLst>
+              <a:ext uri="{28A0092B-C50C-407E-A947-70E740481C1C}">
+                <a14:useLocalDpi xmlns:a14="http://schemas.microsoft.com/office/drawing/2010/main" val="0"/>
+              </a:ext>
+            </a:extLst>
+          </a:blip>
+          <a:stretch>
+            <a:fillRect/>
+          </a:stretch>
+        </p:blipFill>
+        <p:spPr>
+          <a:xfrm>
+            <a:off x="6283708" y="4542024"/>
+            <a:ext cx="1765709" cy="2259897"/>
+          </a:xfrm>
+          <a:prstGeom prst="rect">
+            <a:avLst/>
+          </a:prstGeom>
+        </p:spPr>
+      </p:pic>
+      <p:pic>
+        <p:nvPicPr>
+          <p:cNvPr id="9" name="Picture 8">
+            <a:extLst>
+              <a:ext uri="{FF2B5EF4-FFF2-40B4-BE49-F238E27FC236}">
+                <a16:creationId xmlns:a16="http://schemas.microsoft.com/office/drawing/2014/main" id="{68C91045-D84E-4994-B69E-3D8300FB8597}"/>
+              </a:ext>
+            </a:extLst>
+          </p:cNvPr>
+          <p:cNvPicPr>
+            <a:picLocks noChangeAspect="1"/>
+          </p:cNvPicPr>
+          <p:nvPr/>
+        </p:nvPicPr>
+        <p:blipFill>
+          <a:blip r:embed="rId11" cstate="print">
+            <a:extLst>
+              <a:ext uri="{28A0092B-C50C-407E-A947-70E740481C1C}">
+                <a14:useLocalDpi xmlns:a14="http://schemas.microsoft.com/office/drawing/2010/main" val="0"/>
+              </a:ext>
+            </a:extLst>
+          </a:blip>
+          <a:stretch>
+            <a:fillRect/>
+          </a:stretch>
+        </p:blipFill>
+        <p:spPr>
+          <a:xfrm>
+            <a:off x="3705208" y="4485945"/>
+            <a:ext cx="2060021" cy="2315976"/>
           </a:xfrm>
           <a:prstGeom prst="rect">
             <a:avLst/>
@@ -11799,6 +12739,76 @@
                                   </p:childTnLst>
                                 </p:cTn>
                               </p:par>
+                              <p:par>
+                                <p:cTn id="94" presetID="10" presetClass="entr" presetSubtype="0" fill="hold" nodeType="withEffect">
+                                  <p:stCondLst>
+                                    <p:cond delay="0"/>
+                                  </p:stCondLst>
+                                  <p:childTnLst>
+                                    <p:set>
+                                      <p:cBhvr>
+                                        <p:cTn id="95" dur="1" fill="hold">
+                                          <p:stCondLst>
+                                            <p:cond delay="0"/>
+                                          </p:stCondLst>
+                                        </p:cTn>
+                                        <p:tgtEl>
+                                          <p:spTgt spid="4"/>
+                                        </p:tgtEl>
+                                        <p:attrNameLst>
+                                          <p:attrName>style.visibility</p:attrName>
+                                        </p:attrNameLst>
+                                      </p:cBhvr>
+                                      <p:to>
+                                        <p:strVal val="visible"/>
+                                      </p:to>
+                                    </p:set>
+                                    <p:animEffect transition="in" filter="fade">
+                                      <p:cBhvr>
+                                        <p:cTn id="96" dur="500"/>
+                                        <p:tgtEl>
+                                          <p:spTgt spid="4"/>
+                                        </p:tgtEl>
+                                      </p:cBhvr>
+                                    </p:animEffect>
+                                  </p:childTnLst>
+                                </p:cTn>
+                              </p:par>
+                              <p:par>
+                                <p:cTn id="97" presetID="10" presetClass="entr" presetSubtype="0" fill="hold" nodeType="withEffect">
+                                  <p:stCondLst>
+                                    <p:cond delay="0"/>
+                                  </p:stCondLst>
+                                  <p:childTnLst>
+                                    <p:set>
+                                      <p:cBhvr>
+                                        <p:cTn id="98" dur="1" fill="hold">
+                                          <p:stCondLst>
+                                            <p:cond delay="0"/>
+                                          </p:stCondLst>
+                                        </p:cTn>
+                                        <p:tgtEl>
+                                          <p:spTgt spid="9"/>
+                                        </p:tgtEl>
+                                        <p:attrNameLst>
+                                          <p:attrName>style.visibility</p:attrName>
+                                        </p:attrNameLst>
+                                      </p:cBhvr>
+                                      <p:to>
+                                        <p:strVal val="visible"/>
+                                      </p:to>
+                                    </p:set>
+                                    <p:animEffect transition="in" filter="fade">
+                                      <p:cBhvr>
+                                        <p:cTn id="99" dur="500"/>
+                                        <p:tgtEl>
+                                          <p:spTgt spid="9"/>
+                                        </p:tgtEl>
+                                      </p:cBhvr>
+                                    </p:animEffect>
+                                  </p:childTnLst>
+                                </p:cTn>
+                              </p:par>
                             </p:childTnLst>
                           </p:cTn>
                         </p:par>
@@ -11806,26 +12816,26 @@
                     </p:cTn>
                   </p:par>
                   <p:par>
-                    <p:cTn id="94" fill="hold">
+                    <p:cTn id="100" fill="hold">
                       <p:stCondLst>
                         <p:cond delay="indefinite"/>
                       </p:stCondLst>
                       <p:childTnLst>
                         <p:par>
-                          <p:cTn id="95" fill="hold">
+                          <p:cTn id="101" fill="hold">
                             <p:stCondLst>
                               <p:cond delay="0"/>
                             </p:stCondLst>
                             <p:childTnLst>
                               <p:par>
-                                <p:cTn id="96" presetID="10" presetClass="exit" presetSubtype="0" fill="hold" grpId="1" nodeType="clickEffect">
+                                <p:cTn id="102" presetID="10" presetClass="exit" presetSubtype="0" fill="hold" grpId="1" nodeType="clickEffect">
                                   <p:stCondLst>
                                     <p:cond delay="0"/>
                                   </p:stCondLst>
                                   <p:childTnLst>
                                     <p:animEffect transition="out" filter="fade">
                                       <p:cBhvr>
-                                        <p:cTn id="97" dur="500"/>
+                                        <p:cTn id="103" dur="500"/>
                                         <p:tgtEl>
                                           <p:spTgt spid="12"/>
                                         </p:tgtEl>
@@ -11833,7 +12843,7 @@
                                     </p:animEffect>
                                     <p:set>
                                       <p:cBhvr>
-                                        <p:cTn id="98" dur="1" fill="hold">
+                                        <p:cTn id="104" dur="1" fill="hold">
                                           <p:stCondLst>
                                             <p:cond delay="499"/>
                                           </p:stCondLst>
@@ -11853,14 +12863,14 @@
                                 </p:cTn>
                               </p:par>
                               <p:par>
-                                <p:cTn id="99" presetID="10" presetClass="entr" presetSubtype="0" fill="hold" grpId="1" nodeType="withEffect">
+                                <p:cTn id="105" presetID="10" presetClass="entr" presetSubtype="0" fill="hold" grpId="1" nodeType="withEffect">
                                   <p:stCondLst>
                                     <p:cond delay="0"/>
                                   </p:stCondLst>
                                   <p:childTnLst>
                                     <p:set>
                                       <p:cBhvr>
-                                        <p:cTn id="100" dur="1" fill="hold">
+                                        <p:cTn id="106" dur="1" fill="hold">
                                           <p:stCondLst>
                                             <p:cond delay="0"/>
                                           </p:stCondLst>
@@ -11878,7 +12888,7 @@
                                     </p:set>
                                     <p:animEffect transition="in" filter="fade">
                                       <p:cBhvr>
-                                        <p:cTn id="101" dur="500"/>
+                                        <p:cTn id="107" dur="500"/>
                                         <p:tgtEl>
                                           <p:spTgt spid="8"/>
                                         </p:tgtEl>
@@ -11888,14 +12898,14 @@
                                 </p:cTn>
                               </p:par>
                               <p:par>
-                                <p:cTn id="102" presetID="10" presetClass="exit" presetSubtype="0" fill="hold" grpId="1" nodeType="withEffect">
+                                <p:cTn id="108" presetID="10" presetClass="exit" presetSubtype="0" fill="hold" grpId="1" nodeType="withEffect">
                                   <p:stCondLst>
                                     <p:cond delay="0"/>
                                   </p:stCondLst>
                                   <p:childTnLst>
                                     <p:animEffect transition="out" filter="fade">
                                       <p:cBhvr>
-                                        <p:cTn id="103" dur="500"/>
+                                        <p:cTn id="109" dur="500"/>
                                         <p:tgtEl>
                                           <p:spTgt spid="30"/>
                                         </p:tgtEl>
@@ -11903,7 +12913,7 @@
                                     </p:animEffect>
                                     <p:set>
                                       <p:cBhvr>
-                                        <p:cTn id="104" dur="1" fill="hold">
+                                        <p:cTn id="110" dur="1" fill="hold">
                                           <p:stCondLst>
                                             <p:cond delay="499"/>
                                           </p:stCondLst>
@@ -11923,14 +12933,14 @@
                                 </p:cTn>
                               </p:par>
                               <p:par>
-                                <p:cTn id="105" presetID="2" presetClass="entr" presetSubtype="1" fill="hold" nodeType="withEffect">
+                                <p:cTn id="111" presetID="2" presetClass="entr" presetSubtype="1" fill="hold" nodeType="withEffect">
                                   <p:stCondLst>
                                     <p:cond delay="0"/>
                                   </p:stCondLst>
                                   <p:childTnLst>
                                     <p:set>
                                       <p:cBhvr>
-                                        <p:cTn id="106" dur="1" fill="hold">
+                                        <p:cTn id="112" dur="1" fill="hold">
                                           <p:stCondLst>
                                             <p:cond delay="0"/>
                                           </p:stCondLst>
@@ -11948,7 +12958,7 @@
                                     </p:set>
                                     <p:anim calcmode="lin" valueType="num">
                                       <p:cBhvr additive="base">
-                                        <p:cTn id="107" dur="500" fill="hold"/>
+                                        <p:cTn id="113" dur="500" fill="hold"/>
                                         <p:tgtEl>
                                           <p:spTgt spid="32"/>
                                         </p:tgtEl>
@@ -11971,7 +12981,7 @@
                                     </p:anim>
                                     <p:anim calcmode="lin" valueType="num">
                                       <p:cBhvr additive="base">
-                                        <p:cTn id="108" dur="500" fill="hold"/>
+                                        <p:cTn id="114" dur="500" fill="hold"/>
                                         <p:tgtEl>
                                           <p:spTgt spid="32"/>
                                         </p:tgtEl>
@@ -11995,6 +13005,76 @@
                                   </p:childTnLst>
                                 </p:cTn>
                               </p:par>
+                              <p:par>
+                                <p:cTn id="115" presetID="10" presetClass="exit" presetSubtype="0" fill="hold" nodeType="withEffect">
+                                  <p:stCondLst>
+                                    <p:cond delay="0"/>
+                                  </p:stCondLst>
+                                  <p:childTnLst>
+                                    <p:animEffect transition="out" filter="fade">
+                                      <p:cBhvr>
+                                        <p:cTn id="116" dur="500"/>
+                                        <p:tgtEl>
+                                          <p:spTgt spid="9"/>
+                                        </p:tgtEl>
+                                      </p:cBhvr>
+                                    </p:animEffect>
+                                    <p:set>
+                                      <p:cBhvr>
+                                        <p:cTn id="117" dur="1" fill="hold">
+                                          <p:stCondLst>
+                                            <p:cond delay="499"/>
+                                          </p:stCondLst>
+                                        </p:cTn>
+                                        <p:tgtEl>
+                                          <p:spTgt spid="9"/>
+                                        </p:tgtEl>
+                                        <p:attrNameLst>
+                                          <p:attrName>style.visibility</p:attrName>
+                                        </p:attrNameLst>
+                                      </p:cBhvr>
+                                      <p:to>
+                                        <p:strVal val="hidden"/>
+                                      </p:to>
+                                    </p:set>
+                                  </p:childTnLst>
+                                </p:cTn>
+                              </p:par>
+                              <p:par>
+                                <p:cTn id="118" presetID="10" presetClass="exit" presetSubtype="0" fill="hold" nodeType="withEffect">
+                                  <p:stCondLst>
+                                    <p:cond delay="0"/>
+                                  </p:stCondLst>
+                                  <p:childTnLst>
+                                    <p:animEffect transition="out" filter="fade">
+                                      <p:cBhvr>
+                                        <p:cTn id="119" dur="500"/>
+                                        <p:tgtEl>
+                                          <p:spTgt spid="4"/>
+                                        </p:tgtEl>
+                                      </p:cBhvr>
+                                    </p:animEffect>
+                                    <p:set>
+                                      <p:cBhvr>
+                                        <p:cTn id="120" dur="1" fill="hold">
+                                          <p:stCondLst>
+                                            <p:cond delay="499"/>
+                                          </p:stCondLst>
+                                        </p:cTn>
+                                        <p:tgtEl>
+                                          <p:spTgt spid="4"/>
+                                        </p:tgtEl>
+                                        <p:attrNameLst>
+                                          <p:attrName>style.visibility</p:attrName>
+                                        </p:attrNameLst>
+                                      </p:cBhvr>
+                                      <p:to>
+                                        <p:strVal val="hidden"/>
+                                      </p:to>
+                                    </p:set>
+                                  </p:childTnLst>
+                                </p:cTn>
+                              </p:par>
                             </p:childTnLst>
                           </p:cTn>
                         </p:par>
@@ -12002,26 +13082,26 @@
                     </p:cTn>
                   </p:par>
                   <p:par>
-                    <p:cTn id="109" fill="hold">
+                    <p:cTn id="121" fill="hold">
                       <p:stCondLst>
                         <p:cond delay="indefinite"/>
                       </p:stCondLst>
                       <p:childTnLst>
                         <p:par>
-                          <p:cTn id="110" fill="hold">
+                          <p:cTn id="122" fill="hold">
                             <p:stCondLst>
                               <p:cond delay="0"/>
                             </p:stCondLst>
                             <p:childTnLst>
                               <p:par>
-                                <p:cTn id="111" presetID="2" presetClass="exit" presetSubtype="1" fill="hold" nodeType="clickEffect">
+                                <p:cTn id="123" presetID="2" presetClass="exit" presetSubtype="1" fill="hold" nodeType="clickEffect">
                                   <p:stCondLst>
                                     <p:cond delay="0"/>
                                   </p:stCondLst>
                                   <p:childTnLst>
                                     <p:anim calcmode="lin" valueType="num">
                                       <p:cBhvr additive="base">
-                                        <p:cTn id="112" dur="500"/>
+                                        <p:cTn id="124" dur="500"/>
                                         <p:tgtEl>
                                           <p:spTgt spid="32"/>
                                         </p:tgtEl>
@@ -12044,7 +13124,7 @@
                                     </p:anim>
                                     <p:anim calcmode="lin" valueType="num">
                                       <p:cBhvr additive="base">
-                                        <p:cTn id="113" dur="500"/>
+                                        <p:cTn id="125" dur="500"/>
                                         <p:tgtEl>
                                           <p:spTgt spid="32"/>
                                         </p:tgtEl>
@@ -12067,7 +13147,7 @@
                                     </p:anim>
                                     <p:set>
                                       <p:cBhvr>
-                                        <p:cTn id="114" dur="1" fill="hold">
+                                        <p:cTn id="126" dur="1" fill="hold">
                                           <p:stCondLst>
                                             <p:cond delay="499"/>
                                           </p:stCondLst>

</xml_diff>

<commit_message>
Updated with Audio, Development and Project Areas
</commit_message>
<xml_diff>
--- a/TeamDocs/WordDocs/Presentation/JelBlob_Presentation_AW.pptx
+++ b/TeamDocs/WordDocs/Presentation/JelBlob_Presentation_AW.pptx
@@ -16,9 +16,9 @@
     <p:sldId id="271" r:id="rId7"/>
     <p:sldId id="272" r:id="rId8"/>
     <p:sldId id="262" r:id="rId9"/>
-    <p:sldId id="264" r:id="rId10"/>
-    <p:sldId id="265" r:id="rId11"/>
-    <p:sldId id="270" r:id="rId12"/>
+    <p:sldId id="273" r:id="rId10"/>
+    <p:sldId id="274" r:id="rId11"/>
+    <p:sldId id="275" r:id="rId12"/>
     <p:sldId id="266" r:id="rId13"/>
     <p:sldId id="269" r:id="rId14"/>
     <p:sldId id="267" r:id="rId15"/>
@@ -215,7 +215,7 @@
           <a:p>
             <a:fld id="{9143A75C-4E93-4E57-8FE0-0B5536F2214D}" type="datetimeFigureOut">
               <a:rPr lang="en-US" smtClean="0"/>
-              <a:t>11/20/2017</a:t>
+              <a:t>11/21/2017</a:t>
             </a:fld>
             <a:endParaRPr lang="en-US"/>
           </a:p>
@@ -675,7 +675,7 @@
     </p:spTree>
     <p:extLst>
       <p:ext uri="{BB962C8B-B14F-4D97-AF65-F5344CB8AC3E}">
-        <p14:creationId xmlns:p14="http://schemas.microsoft.com/office/powerpoint/2010/main" val="2936445934"/>
+        <p14:creationId xmlns:p14="http://schemas.microsoft.com/office/powerpoint/2010/main" val="1086646366"/>
       </p:ext>
     </p:extLst>
   </p:cSld>
@@ -1840,7 +1840,7 @@
     </p:spTree>
     <p:extLst>
       <p:ext uri="{BB962C8B-B14F-4D97-AF65-F5344CB8AC3E}">
-        <p14:creationId xmlns:p14="http://schemas.microsoft.com/office/powerpoint/2010/main" val="2455568532"/>
+        <p14:creationId xmlns:p14="http://schemas.microsoft.com/office/powerpoint/2010/main" val="394210661"/>
       </p:ext>
     </p:extLst>
   </p:cSld>
@@ -1947,7 +1947,7 @@
     </p:spTree>
     <p:extLst>
       <p:ext uri="{BB962C8B-B14F-4D97-AF65-F5344CB8AC3E}">
-        <p14:creationId xmlns:p14="http://schemas.microsoft.com/office/powerpoint/2010/main" val="732358467"/>
+        <p14:creationId xmlns:p14="http://schemas.microsoft.com/office/powerpoint/2010/main" val="596496358"/>
       </p:ext>
     </p:extLst>
   </p:cSld>
@@ -2128,7 +2128,7 @@
           <a:p>
             <a:fld id="{349AB840-55CF-4B95-A905-70A2B172BCA3}" type="datetimeFigureOut">
               <a:rPr lang="en-GB" smtClean="0"/>
-              <a:t>20/11/2017</a:t>
+              <a:t>21/11/2017</a:t>
             </a:fld>
             <a:endParaRPr lang="en-GB"/>
           </a:p>
@@ -2440,7 +2440,7 @@
           <a:p>
             <a:fld id="{349AB840-55CF-4B95-A905-70A2B172BCA3}" type="datetimeFigureOut">
               <a:rPr lang="en-GB" smtClean="0"/>
-              <a:t>20/11/2017</a:t>
+              <a:t>21/11/2017</a:t>
             </a:fld>
             <a:endParaRPr lang="en-GB"/>
           </a:p>
@@ -2662,7 +2662,7 @@
           <a:p>
             <a:fld id="{349AB840-55CF-4B95-A905-70A2B172BCA3}" type="datetimeFigureOut">
               <a:rPr lang="en-GB" smtClean="0"/>
-              <a:t>20/11/2017</a:t>
+              <a:t>21/11/2017</a:t>
             </a:fld>
             <a:endParaRPr lang="en-GB"/>
           </a:p>
@@ -2953,7 +2953,7 @@
           <a:p>
             <a:fld id="{349AB840-55CF-4B95-A905-70A2B172BCA3}" type="datetimeFigureOut">
               <a:rPr lang="en-GB" smtClean="0"/>
-              <a:t>20/11/2017</a:t>
+              <a:t>21/11/2017</a:t>
             </a:fld>
             <a:endParaRPr lang="en-GB"/>
           </a:p>
@@ -3407,7 +3407,7 @@
           <a:p>
             <a:fld id="{349AB840-55CF-4B95-A905-70A2B172BCA3}" type="datetimeFigureOut">
               <a:rPr lang="en-GB" smtClean="0"/>
-              <a:t>20/11/2017</a:t>
+              <a:t>21/11/2017</a:t>
             </a:fld>
             <a:endParaRPr lang="en-GB"/>
           </a:p>
@@ -3983,7 +3983,7 @@
           <a:p>
             <a:fld id="{349AB840-55CF-4B95-A905-70A2B172BCA3}" type="datetimeFigureOut">
               <a:rPr lang="en-GB" smtClean="0"/>
-              <a:t>20/11/2017</a:t>
+              <a:t>21/11/2017</a:t>
             </a:fld>
             <a:endParaRPr lang="en-GB"/>
           </a:p>
@@ -4835,7 +4835,7 @@
           <a:p>
             <a:fld id="{349AB840-55CF-4B95-A905-70A2B172BCA3}" type="datetimeFigureOut">
               <a:rPr lang="en-GB" smtClean="0"/>
-              <a:t>20/11/2017</a:t>
+              <a:t>21/11/2017</a:t>
             </a:fld>
             <a:endParaRPr lang="en-GB"/>
           </a:p>
@@ -5040,7 +5040,7 @@
           <a:p>
             <a:fld id="{349AB840-55CF-4B95-A905-70A2B172BCA3}" type="datetimeFigureOut">
               <a:rPr lang="en-GB" smtClean="0"/>
-              <a:t>20/11/2017</a:t>
+              <a:t>21/11/2017</a:t>
             </a:fld>
             <a:endParaRPr lang="en-GB"/>
           </a:p>
@@ -5254,7 +5254,7 @@
           <a:p>
             <a:fld id="{349AB840-55CF-4B95-A905-70A2B172BCA3}" type="datetimeFigureOut">
               <a:rPr lang="en-GB" smtClean="0"/>
-              <a:t>20/11/2017</a:t>
+              <a:t>21/11/2017</a:t>
             </a:fld>
             <a:endParaRPr lang="en-GB"/>
           </a:p>
@@ -5459,7 +5459,7 @@
           <a:p>
             <a:fld id="{349AB840-55CF-4B95-A905-70A2B172BCA3}" type="datetimeFigureOut">
               <a:rPr lang="en-GB" smtClean="0"/>
-              <a:t>20/11/2017</a:t>
+              <a:t>21/11/2017</a:t>
             </a:fld>
             <a:endParaRPr lang="en-GB"/>
           </a:p>
@@ -5739,7 +5739,7 @@
           <a:p>
             <a:fld id="{349AB840-55CF-4B95-A905-70A2B172BCA3}" type="datetimeFigureOut">
               <a:rPr lang="en-GB" smtClean="0"/>
-              <a:t>20/11/2017</a:t>
+              <a:t>21/11/2017</a:t>
             </a:fld>
             <a:endParaRPr lang="en-GB"/>
           </a:p>
@@ -6006,7 +6006,7 @@
           <a:p>
             <a:fld id="{349AB840-55CF-4B95-A905-70A2B172BCA3}" type="datetimeFigureOut">
               <a:rPr lang="en-GB" smtClean="0"/>
-              <a:t>20/11/2017</a:t>
+              <a:t>21/11/2017</a:t>
             </a:fld>
             <a:endParaRPr lang="en-GB"/>
           </a:p>
@@ -6421,7 +6421,7 @@
           <a:p>
             <a:fld id="{349AB840-55CF-4B95-A905-70A2B172BCA3}" type="datetimeFigureOut">
               <a:rPr lang="en-GB" smtClean="0"/>
-              <a:t>20/11/2017</a:t>
+              <a:t>21/11/2017</a:t>
             </a:fld>
             <a:endParaRPr lang="en-GB"/>
           </a:p>
@@ -6569,7 +6569,7 @@
           <a:p>
             <a:fld id="{349AB840-55CF-4B95-A905-70A2B172BCA3}" type="datetimeFigureOut">
               <a:rPr lang="en-GB" smtClean="0"/>
-              <a:t>20/11/2017</a:t>
+              <a:t>21/11/2017</a:t>
             </a:fld>
             <a:endParaRPr lang="en-GB"/>
           </a:p>
@@ -6694,7 +6694,7 @@
           <a:p>
             <a:fld id="{349AB840-55CF-4B95-A905-70A2B172BCA3}" type="datetimeFigureOut">
               <a:rPr lang="en-GB" smtClean="0"/>
-              <a:t>20/11/2017</a:t>
+              <a:t>21/11/2017</a:t>
             </a:fld>
             <a:endParaRPr lang="en-GB"/>
           </a:p>
@@ -6973,7 +6973,7 @@
           <a:p>
             <a:fld id="{349AB840-55CF-4B95-A905-70A2B172BCA3}" type="datetimeFigureOut">
               <a:rPr lang="en-GB" smtClean="0"/>
-              <a:t>20/11/2017</a:t>
+              <a:t>21/11/2017</a:t>
             </a:fld>
             <a:endParaRPr lang="en-GB"/>
           </a:p>
@@ -7285,7 +7285,7 @@
           <a:p>
             <a:fld id="{349AB840-55CF-4B95-A905-70A2B172BCA3}" type="datetimeFigureOut">
               <a:rPr lang="en-GB" smtClean="0"/>
-              <a:t>20/11/2017</a:t>
+              <a:t>21/11/2017</a:t>
             </a:fld>
             <a:endParaRPr lang="en-GB"/>
           </a:p>
@@ -7538,7 +7538,7 @@
           <a:p>
             <a:fld id="{349AB840-55CF-4B95-A905-70A2B172BCA3}" type="datetimeFigureOut">
               <a:rPr lang="en-GB" smtClean="0"/>
-              <a:t>20/11/2017</a:t>
+              <a:t>21/11/2017</a:t>
             </a:fld>
             <a:endParaRPr lang="en-GB"/>
           </a:p>
@@ -8212,6 +8212,13 @@
   <p:clrMapOvr>
     <a:masterClrMapping/>
   </p:clrMapOvr>
+  <p:timing>
+    <p:tnLst>
+      <p:par>
+        <p:cTn id="1" dur="indefinite" restart="never" nodeType="tmRoot"/>
+      </p:par>
+    </p:tnLst>
+  </p:timing>
 </p:sld>
 </file>
 
@@ -8269,6 +8276,100 @@
       </p:grpSpPr>
       <p:sp>
         <p:nvSpPr>
+          <p:cNvPr id="3" name="Content Placeholder 2"/>
+          <p:cNvSpPr>
+            <a:spLocks noGrp="1"/>
+          </p:cNvSpPr>
+          <p:nvPr>
+            <p:ph sz="quarter" idx="13"/>
+          </p:nvPr>
+        </p:nvSpPr>
+        <p:spPr>
+          <a:xfrm>
+            <a:off x="913774" y="2367092"/>
+            <a:ext cx="10363826" cy="2909101"/>
+          </a:xfrm>
+        </p:spPr>
+        <p:style>
+          <a:lnRef idx="2">
+            <a:schemeClr val="dk1"/>
+          </a:lnRef>
+          <a:fillRef idx="1">
+            <a:schemeClr val="lt1"/>
+          </a:fillRef>
+          <a:effectRef idx="0">
+            <a:schemeClr val="dk1"/>
+          </a:effectRef>
+          <a:fontRef idx="minor">
+            <a:schemeClr val="dk1"/>
+          </a:fontRef>
+        </p:style>
+        <p:txBody>
+          <a:bodyPr/>
+          <a:lstStyle/>
+          <a:p>
+            <a:r>
+              <a:rPr lang="en-GB" dirty="0"/>
+              <a:t>Encourages open communication among team </a:t>
+            </a:r>
+            <a:r>
+              <a:rPr lang="en-GB" dirty="0" smtClean="0"/>
+              <a:t>members – small iterations</a:t>
+            </a:r>
+            <a:endParaRPr lang="en-GB" dirty="0"/>
+          </a:p>
+          <a:p>
+            <a:r>
+              <a:rPr lang="en-US" dirty="0" smtClean="0"/>
+              <a:t>By </a:t>
+            </a:r>
+            <a:r>
+              <a:rPr lang="en-US" dirty="0"/>
+              <a:t>breaking down the project into manageable units, the project team can focus on high-quality development and </a:t>
+            </a:r>
+            <a:r>
+              <a:rPr lang="en-US" dirty="0" smtClean="0"/>
+              <a:t>testing</a:t>
+            </a:r>
+          </a:p>
+          <a:p>
+            <a:r>
+              <a:rPr lang="en-GB" dirty="0"/>
+              <a:t>Helps catch defects throughout the development process instead of at the </a:t>
+            </a:r>
+            <a:r>
+              <a:rPr lang="en-GB" dirty="0" smtClean="0"/>
+              <a:t>end</a:t>
+            </a:r>
+          </a:p>
+          <a:p>
+            <a:r>
+              <a:rPr lang="en-GB" dirty="0" smtClean="0"/>
+              <a:t>E.g. enemy colliders missing – </a:t>
+            </a:r>
+            <a:r>
+              <a:rPr lang="en-GB" dirty="0" err="1" smtClean="0"/>
+              <a:t>github</a:t>
+            </a:r>
+            <a:r>
+              <a:rPr lang="en-GB" dirty="0" smtClean="0"/>
+              <a:t> mess up</a:t>
+            </a:r>
+          </a:p>
+          <a:p>
+            <a:r>
+              <a:rPr lang="en-GB" dirty="0" smtClean="0"/>
+              <a:t>Particle system repeating unlimited times</a:t>
+            </a:r>
+            <a:endParaRPr lang="en-GB" dirty="0"/>
+          </a:p>
+          <a:p>
+            <a:endParaRPr lang="en-US" dirty="0"/>
+          </a:p>
+        </p:txBody>
+      </p:sp>
+      <p:sp>
+        <p:nvSpPr>
           <p:cNvPr id="2" name="Title 1"/>
           <p:cNvSpPr>
             <a:spLocks noGrp="1"/>
@@ -8290,32 +8391,40 @@
           </a:p>
         </p:txBody>
       </p:sp>
-      <p:sp>
-        <p:nvSpPr>
-          <p:cNvPr id="3" name="Content Placeholder 2"/>
-          <p:cNvSpPr>
-            <a:spLocks noGrp="1"/>
-          </p:cNvSpPr>
-          <p:nvPr>
-            <p:ph sz="quarter" idx="13"/>
-          </p:nvPr>
-        </p:nvSpPr>
-        <p:spPr/>
-        <p:txBody>
-          <a:bodyPr/>
-          <a:lstStyle/>
-          <a:p>
-            <a:r>
-              <a:rPr lang="en-GB" dirty="0"/>
-              <a:t>[Talk about the Development Model we have gone with (Agile Model); why did we choose that specific model, what were the benefits and mention a practical example of how the Agile approach was useful]</a:t>
-            </a:r>
-          </a:p>
-        </p:txBody>
-      </p:sp>
+      <p:pic>
+        <p:nvPicPr>
+          <p:cNvPr id="4" name="Picture 3"/>
+          <p:cNvPicPr>
+            <a:picLocks noChangeAspect="1"/>
+          </p:cNvPicPr>
+          <p:nvPr/>
+        </p:nvPicPr>
+        <p:blipFill>
+          <a:blip r:embed="rId3">
+            <a:extLst>
+              <a:ext uri="{28A0092B-C50C-407E-A947-70E740481C1C}">
+                <a14:useLocalDpi xmlns:a14="http://schemas.microsoft.com/office/drawing/2010/main" val="0"/>
+              </a:ext>
+            </a:extLst>
+          </a:blip>
+          <a:stretch>
+            <a:fillRect/>
+          </a:stretch>
+        </p:blipFill>
+        <p:spPr>
+          <a:xfrm>
+            <a:off x="4492864" y="1852165"/>
+            <a:ext cx="3205646" cy="3938954"/>
+          </a:xfrm>
+          <a:prstGeom prst="rect">
+            <a:avLst/>
+          </a:prstGeom>
+        </p:spPr>
+      </p:pic>
     </p:spTree>
     <p:extLst>
       <p:ext uri="{BB962C8B-B14F-4D97-AF65-F5344CB8AC3E}">
-        <p14:creationId xmlns:p14="http://schemas.microsoft.com/office/powerpoint/2010/main" val="2467227464"/>
+        <p14:creationId xmlns:p14="http://schemas.microsoft.com/office/powerpoint/2010/main" val="2449710945"/>
       </p:ext>
     </p:extLst>
   </p:cSld>
@@ -8325,6 +8434,560 @@
   <p:transition spd="slow">
     <p:wheel spokes="1"/>
   </p:transition>
+  <p:timing>
+    <p:tnLst>
+      <p:par>
+        <p:cTn id="1" dur="indefinite" restart="never" nodeType="tmRoot">
+          <p:childTnLst>
+            <p:seq concurrent="1" nextAc="seek">
+              <p:cTn id="2" dur="indefinite" nodeType="mainSeq">
+                <p:childTnLst>
+                  <p:par>
+                    <p:cTn id="3" fill="hold">
+                      <p:stCondLst>
+                        <p:cond delay="indefinite"/>
+                      </p:stCondLst>
+                      <p:childTnLst>
+                        <p:par>
+                          <p:cTn id="4" fill="hold">
+                            <p:stCondLst>
+                              <p:cond delay="0"/>
+                            </p:stCondLst>
+                            <p:childTnLst>
+                              <p:par>
+                                <p:cTn id="5" presetID="15" presetClass="entr" presetSubtype="0" fill="hold" nodeType="clickEffect">
+                                  <p:stCondLst>
+                                    <p:cond delay="0"/>
+                                  </p:stCondLst>
+                                  <p:childTnLst>
+                                    <p:set>
+                                      <p:cBhvr>
+                                        <p:cTn id="6" dur="1" fill="hold">
+                                          <p:stCondLst>
+                                            <p:cond delay="0"/>
+                                          </p:stCondLst>
+                                        </p:cTn>
+                                        <p:tgtEl>
+                                          <p:spTgt spid="4"/>
+                                        </p:tgtEl>
+                                        <p:attrNameLst>
+                                          <p:attrName>style.visibility</p:attrName>
+                                        </p:attrNameLst>
+                                      </p:cBhvr>
+                                      <p:to>
+                                        <p:strVal val="visible"/>
+                                      </p:to>
+                                    </p:set>
+                                    <p:anim calcmode="lin" valueType="num">
+                                      <p:cBhvr>
+                                        <p:cTn id="7" dur="1000" fill="hold"/>
+                                        <p:tgtEl>
+                                          <p:spTgt spid="4"/>
+                                        </p:tgtEl>
+                                        <p:attrNameLst>
+                                          <p:attrName>ppt_w</p:attrName>
+                                        </p:attrNameLst>
+                                      </p:cBhvr>
+                                      <p:tavLst>
+                                        <p:tav tm="0">
+                                          <p:val>
+                                            <p:fltVal val="0"/>
+                                          </p:val>
+                                        </p:tav>
+                                        <p:tav tm="100000">
+                                          <p:val>
+                                            <p:strVal val="#ppt_w"/>
+                                          </p:val>
+                                        </p:tav>
+                                      </p:tavLst>
+                                    </p:anim>
+                                    <p:anim calcmode="lin" valueType="num">
+                                      <p:cBhvr>
+                                        <p:cTn id="8" dur="1000" fill="hold"/>
+                                        <p:tgtEl>
+                                          <p:spTgt spid="4"/>
+                                        </p:tgtEl>
+                                        <p:attrNameLst>
+                                          <p:attrName>ppt_h</p:attrName>
+                                        </p:attrNameLst>
+                                      </p:cBhvr>
+                                      <p:tavLst>
+                                        <p:tav tm="0">
+                                          <p:val>
+                                            <p:fltVal val="0"/>
+                                          </p:val>
+                                        </p:tav>
+                                        <p:tav tm="100000">
+                                          <p:val>
+                                            <p:strVal val="#ppt_h"/>
+                                          </p:val>
+                                        </p:tav>
+                                      </p:tavLst>
+                                    </p:anim>
+                                    <p:anim calcmode="lin" valueType="num">
+                                      <p:cBhvr>
+                                        <p:cTn id="9" dur="1000" fill="hold"/>
+                                        <p:tgtEl>
+                                          <p:spTgt spid="4"/>
+                                        </p:tgtEl>
+                                        <p:attrNameLst>
+                                          <p:attrName>ppt_x</p:attrName>
+                                        </p:attrNameLst>
+                                      </p:cBhvr>
+                                      <p:tavLst>
+                                        <p:tav tm="0" fmla="#ppt_x+(cos(-2*pi*(1-$))*-#ppt_x-sin(-2*pi*(1-$))*(1-#ppt_y))*(1-$)">
+                                          <p:val>
+                                            <p:fltVal val="0"/>
+                                          </p:val>
+                                        </p:tav>
+                                        <p:tav tm="100000">
+                                          <p:val>
+                                            <p:fltVal val="1"/>
+                                          </p:val>
+                                        </p:tav>
+                                      </p:tavLst>
+                                    </p:anim>
+                                    <p:anim calcmode="lin" valueType="num">
+                                      <p:cBhvr>
+                                        <p:cTn id="10" dur="1000" fill="hold"/>
+                                        <p:tgtEl>
+                                          <p:spTgt spid="4"/>
+                                        </p:tgtEl>
+                                        <p:attrNameLst>
+                                          <p:attrName>ppt_y</p:attrName>
+                                        </p:attrNameLst>
+                                      </p:cBhvr>
+                                      <p:tavLst>
+                                        <p:tav tm="0" fmla="#ppt_y+(sin(-2*pi*(1-$))*-#ppt_x+cos(-2*pi*(1-$))*(1-#ppt_y))*(1-$)">
+                                          <p:val>
+                                            <p:fltVal val="0"/>
+                                          </p:val>
+                                        </p:tav>
+                                        <p:tav tm="100000">
+                                          <p:val>
+                                            <p:fltVal val="1"/>
+                                          </p:val>
+                                        </p:tav>
+                                      </p:tavLst>
+                                    </p:anim>
+                                  </p:childTnLst>
+                                </p:cTn>
+                              </p:par>
+                            </p:childTnLst>
+                          </p:cTn>
+                        </p:par>
+                      </p:childTnLst>
+                    </p:cTn>
+                  </p:par>
+                  <p:par>
+                    <p:cTn id="11" fill="hold">
+                      <p:stCondLst>
+                        <p:cond delay="indefinite"/>
+                      </p:stCondLst>
+                      <p:childTnLst>
+                        <p:par>
+                          <p:cTn id="12" fill="hold">
+                            <p:stCondLst>
+                              <p:cond delay="0"/>
+                            </p:stCondLst>
+                            <p:childTnLst>
+                              <p:par>
+                                <p:cTn id="13" presetID="42" presetClass="path" presetSubtype="0" accel="50000" decel="50000" fill="hold" nodeType="clickEffect">
+                                  <p:stCondLst>
+                                    <p:cond delay="0"/>
+                                  </p:stCondLst>
+                                  <p:childTnLst>
+                                    <p:animMotion origin="layout" path="M 2.08333E-7 4.07407E-6 L 0.37174 0.23449 " pathEditMode="relative" rAng="0" ptsTypes="AA">
+                                      <p:cBhvr>
+                                        <p:cTn id="14" dur="2000" fill="hold"/>
+                                        <p:tgtEl>
+                                          <p:spTgt spid="4"/>
+                                        </p:tgtEl>
+                                        <p:attrNameLst>
+                                          <p:attrName>ppt_x</p:attrName>
+                                          <p:attrName>ppt_y</p:attrName>
+                                        </p:attrNameLst>
+                                      </p:cBhvr>
+                                      <p:rCtr x="18581" y="11713"/>
+                                    </p:animMotion>
+                                  </p:childTnLst>
+                                </p:cTn>
+                              </p:par>
+                              <p:par>
+                                <p:cTn id="15" presetID="16" presetClass="entr" presetSubtype="21" fill="hold" grpId="0" nodeType="withEffect">
+                                  <p:stCondLst>
+                                    <p:cond delay="0"/>
+                                  </p:stCondLst>
+                                  <p:childTnLst>
+                                    <p:set>
+                                      <p:cBhvr>
+                                        <p:cTn id="16" dur="1" fill="hold">
+                                          <p:stCondLst>
+                                            <p:cond delay="0"/>
+                                          </p:stCondLst>
+                                        </p:cTn>
+                                        <p:tgtEl>
+                                          <p:spTgt spid="3">
+                                            <p:bg/>
+                                          </p:spTgt>
+                                        </p:tgtEl>
+                                        <p:attrNameLst>
+                                          <p:attrName>style.visibility</p:attrName>
+                                        </p:attrNameLst>
+                                      </p:cBhvr>
+                                      <p:to>
+                                        <p:strVal val="visible"/>
+                                      </p:to>
+                                    </p:set>
+                                    <p:animEffect transition="in" filter="barn(inVertical)">
+                                      <p:cBhvr>
+                                        <p:cTn id="17" dur="500"/>
+                                        <p:tgtEl>
+                                          <p:spTgt spid="3">
+                                            <p:bg/>
+                                          </p:spTgt>
+                                        </p:tgtEl>
+                                      </p:cBhvr>
+                                    </p:animEffect>
+                                  </p:childTnLst>
+                                </p:cTn>
+                              </p:par>
+                            </p:childTnLst>
+                          </p:cTn>
+                        </p:par>
+                      </p:childTnLst>
+                    </p:cTn>
+                  </p:par>
+                  <p:par>
+                    <p:cTn id="18" fill="hold">
+                      <p:stCondLst>
+                        <p:cond delay="indefinite"/>
+                      </p:stCondLst>
+                      <p:childTnLst>
+                        <p:par>
+                          <p:cTn id="19" fill="hold">
+                            <p:stCondLst>
+                              <p:cond delay="0"/>
+                            </p:stCondLst>
+                            <p:childTnLst>
+                              <p:par>
+                                <p:cTn id="20" presetID="16" presetClass="entr" presetSubtype="21" fill="hold" grpId="0" nodeType="clickEffect">
+                                  <p:stCondLst>
+                                    <p:cond delay="0"/>
+                                  </p:stCondLst>
+                                  <p:childTnLst>
+                                    <p:set>
+                                      <p:cBhvr>
+                                        <p:cTn id="21" dur="1" fill="hold">
+                                          <p:stCondLst>
+                                            <p:cond delay="0"/>
+                                          </p:stCondLst>
+                                        </p:cTn>
+                                        <p:tgtEl>
+                                          <p:spTgt spid="3">
+                                            <p:txEl>
+                                              <p:pRg st="0" end="0"/>
+                                            </p:txEl>
+                                          </p:spTgt>
+                                        </p:tgtEl>
+                                        <p:attrNameLst>
+                                          <p:attrName>style.visibility</p:attrName>
+                                        </p:attrNameLst>
+                                      </p:cBhvr>
+                                      <p:to>
+                                        <p:strVal val="visible"/>
+                                      </p:to>
+                                    </p:set>
+                                    <p:animEffect transition="in" filter="barn(inVertical)">
+                                      <p:cBhvr>
+                                        <p:cTn id="22" dur="500"/>
+                                        <p:tgtEl>
+                                          <p:spTgt spid="3">
+                                            <p:txEl>
+                                              <p:pRg st="0" end="0"/>
+                                            </p:txEl>
+                                          </p:spTgt>
+                                        </p:tgtEl>
+                                      </p:cBhvr>
+                                    </p:animEffect>
+                                  </p:childTnLst>
+                                </p:cTn>
+                              </p:par>
+                            </p:childTnLst>
+                          </p:cTn>
+                        </p:par>
+                      </p:childTnLst>
+                    </p:cTn>
+                  </p:par>
+                  <p:par>
+                    <p:cTn id="23" fill="hold">
+                      <p:stCondLst>
+                        <p:cond delay="indefinite"/>
+                      </p:stCondLst>
+                      <p:childTnLst>
+                        <p:par>
+                          <p:cTn id="24" fill="hold">
+                            <p:stCondLst>
+                              <p:cond delay="0"/>
+                            </p:stCondLst>
+                            <p:childTnLst>
+                              <p:par>
+                                <p:cTn id="25" presetID="16" presetClass="entr" presetSubtype="21" fill="hold" grpId="0" nodeType="clickEffect">
+                                  <p:stCondLst>
+                                    <p:cond delay="0"/>
+                                  </p:stCondLst>
+                                  <p:childTnLst>
+                                    <p:set>
+                                      <p:cBhvr>
+                                        <p:cTn id="26" dur="1" fill="hold">
+                                          <p:stCondLst>
+                                            <p:cond delay="0"/>
+                                          </p:stCondLst>
+                                        </p:cTn>
+                                        <p:tgtEl>
+                                          <p:spTgt spid="3">
+                                            <p:txEl>
+                                              <p:pRg st="1" end="1"/>
+                                            </p:txEl>
+                                          </p:spTgt>
+                                        </p:tgtEl>
+                                        <p:attrNameLst>
+                                          <p:attrName>style.visibility</p:attrName>
+                                        </p:attrNameLst>
+                                      </p:cBhvr>
+                                      <p:to>
+                                        <p:strVal val="visible"/>
+                                      </p:to>
+                                    </p:set>
+                                    <p:animEffect transition="in" filter="barn(inVertical)">
+                                      <p:cBhvr>
+                                        <p:cTn id="27" dur="500"/>
+                                        <p:tgtEl>
+                                          <p:spTgt spid="3">
+                                            <p:txEl>
+                                              <p:pRg st="1" end="1"/>
+                                            </p:txEl>
+                                          </p:spTgt>
+                                        </p:tgtEl>
+                                      </p:cBhvr>
+                                    </p:animEffect>
+                                  </p:childTnLst>
+                                </p:cTn>
+                              </p:par>
+                            </p:childTnLst>
+                          </p:cTn>
+                        </p:par>
+                      </p:childTnLst>
+                    </p:cTn>
+                  </p:par>
+                  <p:par>
+                    <p:cTn id="28" fill="hold">
+                      <p:stCondLst>
+                        <p:cond delay="indefinite"/>
+                      </p:stCondLst>
+                      <p:childTnLst>
+                        <p:par>
+                          <p:cTn id="29" fill="hold">
+                            <p:stCondLst>
+                              <p:cond delay="0"/>
+                            </p:stCondLst>
+                            <p:childTnLst>
+                              <p:par>
+                                <p:cTn id="30" presetID="16" presetClass="entr" presetSubtype="21" fill="hold" grpId="0" nodeType="clickEffect">
+                                  <p:stCondLst>
+                                    <p:cond delay="0"/>
+                                  </p:stCondLst>
+                                  <p:childTnLst>
+                                    <p:set>
+                                      <p:cBhvr>
+                                        <p:cTn id="31" dur="1" fill="hold">
+                                          <p:stCondLst>
+                                            <p:cond delay="0"/>
+                                          </p:stCondLst>
+                                        </p:cTn>
+                                        <p:tgtEl>
+                                          <p:spTgt spid="3">
+                                            <p:txEl>
+                                              <p:pRg st="2" end="2"/>
+                                            </p:txEl>
+                                          </p:spTgt>
+                                        </p:tgtEl>
+                                        <p:attrNameLst>
+                                          <p:attrName>style.visibility</p:attrName>
+                                        </p:attrNameLst>
+                                      </p:cBhvr>
+                                      <p:to>
+                                        <p:strVal val="visible"/>
+                                      </p:to>
+                                    </p:set>
+                                    <p:animEffect transition="in" filter="barn(inVertical)">
+                                      <p:cBhvr>
+                                        <p:cTn id="32" dur="500"/>
+                                        <p:tgtEl>
+                                          <p:spTgt spid="3">
+                                            <p:txEl>
+                                              <p:pRg st="2" end="2"/>
+                                            </p:txEl>
+                                          </p:spTgt>
+                                        </p:tgtEl>
+                                      </p:cBhvr>
+                                    </p:animEffect>
+                                  </p:childTnLst>
+                                </p:cTn>
+                              </p:par>
+                            </p:childTnLst>
+                          </p:cTn>
+                        </p:par>
+                      </p:childTnLst>
+                    </p:cTn>
+                  </p:par>
+                  <p:par>
+                    <p:cTn id="33" fill="hold">
+                      <p:stCondLst>
+                        <p:cond delay="indefinite"/>
+                      </p:stCondLst>
+                      <p:childTnLst>
+                        <p:par>
+                          <p:cTn id="34" fill="hold">
+                            <p:stCondLst>
+                              <p:cond delay="0"/>
+                            </p:stCondLst>
+                            <p:childTnLst>
+                              <p:par>
+                                <p:cTn id="35" presetID="16" presetClass="entr" presetSubtype="21" fill="hold" grpId="0" nodeType="clickEffect">
+                                  <p:stCondLst>
+                                    <p:cond delay="0"/>
+                                  </p:stCondLst>
+                                  <p:childTnLst>
+                                    <p:set>
+                                      <p:cBhvr>
+                                        <p:cTn id="36" dur="1" fill="hold">
+                                          <p:stCondLst>
+                                            <p:cond delay="0"/>
+                                          </p:stCondLst>
+                                        </p:cTn>
+                                        <p:tgtEl>
+                                          <p:spTgt spid="3">
+                                            <p:txEl>
+                                              <p:pRg st="3" end="3"/>
+                                            </p:txEl>
+                                          </p:spTgt>
+                                        </p:tgtEl>
+                                        <p:attrNameLst>
+                                          <p:attrName>style.visibility</p:attrName>
+                                        </p:attrNameLst>
+                                      </p:cBhvr>
+                                      <p:to>
+                                        <p:strVal val="visible"/>
+                                      </p:to>
+                                    </p:set>
+                                    <p:animEffect transition="in" filter="barn(inVertical)">
+                                      <p:cBhvr>
+                                        <p:cTn id="37" dur="500"/>
+                                        <p:tgtEl>
+                                          <p:spTgt spid="3">
+                                            <p:txEl>
+                                              <p:pRg st="3" end="3"/>
+                                            </p:txEl>
+                                          </p:spTgt>
+                                        </p:tgtEl>
+                                      </p:cBhvr>
+                                    </p:animEffect>
+                                  </p:childTnLst>
+                                </p:cTn>
+                              </p:par>
+                            </p:childTnLst>
+                          </p:cTn>
+                        </p:par>
+                      </p:childTnLst>
+                    </p:cTn>
+                  </p:par>
+                  <p:par>
+                    <p:cTn id="38" fill="hold">
+                      <p:stCondLst>
+                        <p:cond delay="indefinite"/>
+                      </p:stCondLst>
+                      <p:childTnLst>
+                        <p:par>
+                          <p:cTn id="39" fill="hold">
+                            <p:stCondLst>
+                              <p:cond delay="0"/>
+                            </p:stCondLst>
+                            <p:childTnLst>
+                              <p:par>
+                                <p:cTn id="40" presetID="16" presetClass="entr" presetSubtype="21" fill="hold" grpId="0" nodeType="clickEffect">
+                                  <p:stCondLst>
+                                    <p:cond delay="0"/>
+                                  </p:stCondLst>
+                                  <p:childTnLst>
+                                    <p:set>
+                                      <p:cBhvr>
+                                        <p:cTn id="41" dur="1" fill="hold">
+                                          <p:stCondLst>
+                                            <p:cond delay="0"/>
+                                          </p:stCondLst>
+                                        </p:cTn>
+                                        <p:tgtEl>
+                                          <p:spTgt spid="3">
+                                            <p:txEl>
+                                              <p:pRg st="4" end="4"/>
+                                            </p:txEl>
+                                          </p:spTgt>
+                                        </p:tgtEl>
+                                        <p:attrNameLst>
+                                          <p:attrName>style.visibility</p:attrName>
+                                        </p:attrNameLst>
+                                      </p:cBhvr>
+                                      <p:to>
+                                        <p:strVal val="visible"/>
+                                      </p:to>
+                                    </p:set>
+                                    <p:animEffect transition="in" filter="barn(inVertical)">
+                                      <p:cBhvr>
+                                        <p:cTn id="42" dur="500"/>
+                                        <p:tgtEl>
+                                          <p:spTgt spid="3">
+                                            <p:txEl>
+                                              <p:pRg st="4" end="4"/>
+                                            </p:txEl>
+                                          </p:spTgt>
+                                        </p:tgtEl>
+                                      </p:cBhvr>
+                                    </p:animEffect>
+                                  </p:childTnLst>
+                                </p:cTn>
+                              </p:par>
+                            </p:childTnLst>
+                          </p:cTn>
+                        </p:par>
+                      </p:childTnLst>
+                    </p:cTn>
+                  </p:par>
+                </p:childTnLst>
+              </p:cTn>
+              <p:prevCondLst>
+                <p:cond evt="onPrev" delay="0">
+                  <p:tgtEl>
+                    <p:sldTgt/>
+                  </p:tgtEl>
+                </p:cond>
+              </p:prevCondLst>
+              <p:nextCondLst>
+                <p:cond evt="onNext" delay="0">
+                  <p:tgtEl>
+                    <p:sldTgt/>
+                  </p:tgtEl>
+                </p:cond>
+              </p:nextCondLst>
+            </p:seq>
+          </p:childTnLst>
+        </p:cTn>
+      </p:par>
+    </p:tnLst>
+    <p:bldLst>
+      <p:bldP spid="3" grpId="0" uiExpand="1" build="p" animBg="1"/>
+    </p:bldLst>
+  </p:timing>
 </p:sld>
 </file>
 
@@ -8413,22 +9076,110 @@
             <p:ph sz="quarter" idx="13"/>
           </p:nvPr>
         </p:nvSpPr>
-        <p:spPr/>
+        <p:spPr>
+          <a:xfrm>
+            <a:off x="914400" y="1810045"/>
+            <a:ext cx="10363826" cy="3056246"/>
+          </a:xfrm>
+        </p:spPr>
+        <p:style>
+          <a:lnRef idx="2">
+            <a:schemeClr val="dk1"/>
+          </a:lnRef>
+          <a:fillRef idx="1">
+            <a:schemeClr val="lt1"/>
+          </a:fillRef>
+          <a:effectRef idx="0">
+            <a:schemeClr val="dk1"/>
+          </a:effectRef>
+          <a:fontRef idx="minor">
+            <a:schemeClr val="dk1"/>
+          </a:fontRef>
+        </p:style>
         <p:txBody>
           <a:bodyPr/>
           <a:lstStyle/>
           <a:p>
             <a:r>
-              <a:rPr lang="en-GB" dirty="0"/>
-              <a:t>[Talk about the use of GitHub and version control – how you found using it and how beneficial was it for file sharing and project communication]</a:t>
-            </a:r>
+              <a:rPr lang="en-GB" dirty="0" smtClean="0"/>
+              <a:t>Used </a:t>
+            </a:r>
+            <a:r>
+              <a:rPr lang="en-GB" dirty="0" err="1" smtClean="0"/>
+              <a:t>Github</a:t>
+            </a:r>
+            <a:r>
+              <a:rPr lang="en-GB" dirty="0" smtClean="0"/>
+              <a:t> for version control – unity smaller files – git Ignore</a:t>
+            </a:r>
+          </a:p>
+          <a:p>
+            <a:r>
+              <a:rPr lang="en-GB" dirty="0" smtClean="0"/>
+              <a:t>For the most part it worked well for all team members</a:t>
+            </a:r>
+          </a:p>
+          <a:p>
+            <a:r>
+              <a:rPr lang="en-GB" dirty="0" smtClean="0"/>
+              <a:t>One instance of losing a few lines of code</a:t>
+            </a:r>
+          </a:p>
+          <a:p>
+            <a:r>
+              <a:rPr lang="en-GB" dirty="0" smtClean="0"/>
+              <a:t>Commits are great for updates with detailed specifics below them</a:t>
+            </a:r>
+          </a:p>
+          <a:p>
+            <a:r>
+              <a:rPr lang="en-GB" dirty="0" smtClean="0"/>
+              <a:t>Shows exactly side by side what has changed wither removed or added</a:t>
+            </a:r>
+          </a:p>
+          <a:p>
+            <a:r>
+              <a:rPr lang="en-GB" dirty="0" smtClean="0"/>
+              <a:t>Would use again for a small project within 1gb/100mb limits</a:t>
+            </a:r>
+            <a:endParaRPr lang="en-GB" dirty="0"/>
           </a:p>
         </p:txBody>
       </p:sp>
+      <p:pic>
+        <p:nvPicPr>
+          <p:cNvPr id="4" name="Picture 3"/>
+          <p:cNvPicPr>
+            <a:picLocks noChangeAspect="1"/>
+          </p:cNvPicPr>
+          <p:nvPr/>
+        </p:nvPicPr>
+        <p:blipFill>
+          <a:blip r:embed="rId3" cstate="print">
+            <a:extLst>
+              <a:ext uri="{28A0092B-C50C-407E-A947-70E740481C1C}">
+                <a14:useLocalDpi xmlns:a14="http://schemas.microsoft.com/office/drawing/2010/main" val="0"/>
+              </a:ext>
+            </a:extLst>
+          </a:blip>
+          <a:stretch>
+            <a:fillRect/>
+          </a:stretch>
+        </p:blipFill>
+        <p:spPr>
+          <a:xfrm>
+            <a:off x="4037204" y="4866291"/>
+            <a:ext cx="4117592" cy="1526254"/>
+          </a:xfrm>
+          <a:prstGeom prst="rect">
+            <a:avLst/>
+          </a:prstGeom>
+        </p:spPr>
+      </p:pic>
     </p:spTree>
     <p:extLst>
       <p:ext uri="{BB962C8B-B14F-4D97-AF65-F5344CB8AC3E}">
-        <p14:creationId xmlns:p14="http://schemas.microsoft.com/office/powerpoint/2010/main" val="3656021057"/>
+        <p14:creationId xmlns:p14="http://schemas.microsoft.com/office/powerpoint/2010/main" val="3715362014"/>
       </p:ext>
     </p:extLst>
   </p:cSld>
@@ -8447,6 +9198,591 @@
       </p:transition>
     </mc:Fallback>
   </mc:AlternateContent>
+  <p:timing>
+    <p:tnLst>
+      <p:par>
+        <p:cTn id="1" dur="indefinite" restart="never" nodeType="tmRoot">
+          <p:childTnLst>
+            <p:seq concurrent="1" nextAc="seek">
+              <p:cTn id="2" dur="indefinite" nodeType="mainSeq">
+                <p:childTnLst>
+                  <p:par>
+                    <p:cTn id="3" fill="hold">
+                      <p:stCondLst>
+                        <p:cond delay="indefinite"/>
+                      </p:stCondLst>
+                      <p:childTnLst>
+                        <p:par>
+                          <p:cTn id="4" fill="hold">
+                            <p:stCondLst>
+                              <p:cond delay="0"/>
+                            </p:stCondLst>
+                            <p:childTnLst>
+                              <p:par>
+                                <p:cTn id="5" presetID="14" presetClass="entr" presetSubtype="10" fill="hold" nodeType="clickEffect">
+                                  <p:stCondLst>
+                                    <p:cond delay="0"/>
+                                  </p:stCondLst>
+                                  <p:childTnLst>
+                                    <p:set>
+                                      <p:cBhvr>
+                                        <p:cTn id="6" dur="1" fill="hold">
+                                          <p:stCondLst>
+                                            <p:cond delay="0"/>
+                                          </p:stCondLst>
+                                        </p:cTn>
+                                        <p:tgtEl>
+                                          <p:spTgt spid="3">
+                                            <p:txEl>
+                                              <p:pRg st="0" end="0"/>
+                                            </p:txEl>
+                                          </p:spTgt>
+                                        </p:tgtEl>
+                                        <p:attrNameLst>
+                                          <p:attrName>style.visibility</p:attrName>
+                                        </p:attrNameLst>
+                                      </p:cBhvr>
+                                      <p:to>
+                                        <p:strVal val="visible"/>
+                                      </p:to>
+                                    </p:set>
+                                    <p:animEffect transition="in" filter="randombar(horizontal)">
+                                      <p:cBhvr>
+                                        <p:cTn id="7" dur="500"/>
+                                        <p:tgtEl>
+                                          <p:spTgt spid="3">
+                                            <p:txEl>
+                                              <p:pRg st="0" end="0"/>
+                                            </p:txEl>
+                                          </p:spTgt>
+                                        </p:tgtEl>
+                                      </p:cBhvr>
+                                    </p:animEffect>
+                                  </p:childTnLst>
+                                </p:cTn>
+                              </p:par>
+                              <p:par>
+                                <p:cTn id="8" presetID="42" presetClass="entr" presetSubtype="0" fill="hold" nodeType="withEffect">
+                                  <p:stCondLst>
+                                    <p:cond delay="0"/>
+                                  </p:stCondLst>
+                                  <p:childTnLst>
+                                    <p:set>
+                                      <p:cBhvr>
+                                        <p:cTn id="9" dur="1" fill="hold">
+                                          <p:stCondLst>
+                                            <p:cond delay="0"/>
+                                          </p:stCondLst>
+                                        </p:cTn>
+                                        <p:tgtEl>
+                                          <p:spTgt spid="4"/>
+                                        </p:tgtEl>
+                                        <p:attrNameLst>
+                                          <p:attrName>style.visibility</p:attrName>
+                                        </p:attrNameLst>
+                                      </p:cBhvr>
+                                      <p:to>
+                                        <p:strVal val="visible"/>
+                                      </p:to>
+                                    </p:set>
+                                    <p:animEffect transition="in" filter="fade">
+                                      <p:cBhvr>
+                                        <p:cTn id="10" dur="1000"/>
+                                        <p:tgtEl>
+                                          <p:spTgt spid="4"/>
+                                        </p:tgtEl>
+                                      </p:cBhvr>
+                                    </p:animEffect>
+                                    <p:anim calcmode="lin" valueType="num">
+                                      <p:cBhvr>
+                                        <p:cTn id="11" dur="1000" fill="hold"/>
+                                        <p:tgtEl>
+                                          <p:spTgt spid="4"/>
+                                        </p:tgtEl>
+                                        <p:attrNameLst>
+                                          <p:attrName>ppt_x</p:attrName>
+                                        </p:attrNameLst>
+                                      </p:cBhvr>
+                                      <p:tavLst>
+                                        <p:tav tm="0">
+                                          <p:val>
+                                            <p:strVal val="#ppt_x"/>
+                                          </p:val>
+                                        </p:tav>
+                                        <p:tav tm="100000">
+                                          <p:val>
+                                            <p:strVal val="#ppt_x"/>
+                                          </p:val>
+                                        </p:tav>
+                                      </p:tavLst>
+                                    </p:anim>
+                                    <p:anim calcmode="lin" valueType="num">
+                                      <p:cBhvr>
+                                        <p:cTn id="12" dur="1000" fill="hold"/>
+                                        <p:tgtEl>
+                                          <p:spTgt spid="4"/>
+                                        </p:tgtEl>
+                                        <p:attrNameLst>
+                                          <p:attrName>ppt_y</p:attrName>
+                                        </p:attrNameLst>
+                                      </p:cBhvr>
+                                      <p:tavLst>
+                                        <p:tav tm="0">
+                                          <p:val>
+                                            <p:strVal val="#ppt_y+.1"/>
+                                          </p:val>
+                                        </p:tav>
+                                        <p:tav tm="100000">
+                                          <p:val>
+                                            <p:strVal val="#ppt_y"/>
+                                          </p:val>
+                                        </p:tav>
+                                      </p:tavLst>
+                                    </p:anim>
+                                  </p:childTnLst>
+                                </p:cTn>
+                              </p:par>
+                            </p:childTnLst>
+                          </p:cTn>
+                        </p:par>
+                      </p:childTnLst>
+                    </p:cTn>
+                  </p:par>
+                  <p:par>
+                    <p:cTn id="13" fill="hold">
+                      <p:stCondLst>
+                        <p:cond delay="indefinite"/>
+                      </p:stCondLst>
+                      <p:childTnLst>
+                        <p:par>
+                          <p:cTn id="14" fill="hold">
+                            <p:stCondLst>
+                              <p:cond delay="0"/>
+                            </p:stCondLst>
+                            <p:childTnLst>
+                              <p:par>
+                                <p:cTn id="15" presetID="14" presetClass="entr" presetSubtype="10" fill="hold" nodeType="clickEffect">
+                                  <p:stCondLst>
+                                    <p:cond delay="0"/>
+                                  </p:stCondLst>
+                                  <p:childTnLst>
+                                    <p:set>
+                                      <p:cBhvr>
+                                        <p:cTn id="16" dur="1" fill="hold">
+                                          <p:stCondLst>
+                                            <p:cond delay="0"/>
+                                          </p:stCondLst>
+                                        </p:cTn>
+                                        <p:tgtEl>
+                                          <p:spTgt spid="3">
+                                            <p:txEl>
+                                              <p:pRg st="1" end="1"/>
+                                            </p:txEl>
+                                          </p:spTgt>
+                                        </p:tgtEl>
+                                        <p:attrNameLst>
+                                          <p:attrName>style.visibility</p:attrName>
+                                        </p:attrNameLst>
+                                      </p:cBhvr>
+                                      <p:to>
+                                        <p:strVal val="visible"/>
+                                      </p:to>
+                                    </p:set>
+                                    <p:animEffect transition="in" filter="randombar(horizontal)">
+                                      <p:cBhvr>
+                                        <p:cTn id="17" dur="500"/>
+                                        <p:tgtEl>
+                                          <p:spTgt spid="3">
+                                            <p:txEl>
+                                              <p:pRg st="1" end="1"/>
+                                            </p:txEl>
+                                          </p:spTgt>
+                                        </p:tgtEl>
+                                      </p:cBhvr>
+                                    </p:animEffect>
+                                  </p:childTnLst>
+                                </p:cTn>
+                              </p:par>
+                            </p:childTnLst>
+                          </p:cTn>
+                        </p:par>
+                      </p:childTnLst>
+                    </p:cTn>
+                  </p:par>
+                  <p:par>
+                    <p:cTn id="18" fill="hold">
+                      <p:stCondLst>
+                        <p:cond delay="indefinite"/>
+                      </p:stCondLst>
+                      <p:childTnLst>
+                        <p:par>
+                          <p:cTn id="19" fill="hold">
+                            <p:stCondLst>
+                              <p:cond delay="0"/>
+                            </p:stCondLst>
+                            <p:childTnLst>
+                              <p:par>
+                                <p:cTn id="20" presetID="53" presetClass="entr" presetSubtype="16" fill="hold" nodeType="clickEffect">
+                                  <p:stCondLst>
+                                    <p:cond delay="0"/>
+                                  </p:stCondLst>
+                                  <p:childTnLst>
+                                    <p:set>
+                                      <p:cBhvr>
+                                        <p:cTn id="21" dur="1" fill="hold">
+                                          <p:stCondLst>
+                                            <p:cond delay="0"/>
+                                          </p:stCondLst>
+                                        </p:cTn>
+                                        <p:tgtEl>
+                                          <p:spTgt spid="3">
+                                            <p:txEl>
+                                              <p:pRg st="2" end="2"/>
+                                            </p:txEl>
+                                          </p:spTgt>
+                                        </p:tgtEl>
+                                        <p:attrNameLst>
+                                          <p:attrName>style.visibility</p:attrName>
+                                        </p:attrNameLst>
+                                      </p:cBhvr>
+                                      <p:to>
+                                        <p:strVal val="visible"/>
+                                      </p:to>
+                                    </p:set>
+                                    <p:anim calcmode="lin" valueType="num">
+                                      <p:cBhvr>
+                                        <p:cTn id="22" dur="500" fill="hold"/>
+                                        <p:tgtEl>
+                                          <p:spTgt spid="3">
+                                            <p:txEl>
+                                              <p:pRg st="2" end="2"/>
+                                            </p:txEl>
+                                          </p:spTgt>
+                                        </p:tgtEl>
+                                        <p:attrNameLst>
+                                          <p:attrName>ppt_w</p:attrName>
+                                        </p:attrNameLst>
+                                      </p:cBhvr>
+                                      <p:tavLst>
+                                        <p:tav tm="0">
+                                          <p:val>
+                                            <p:fltVal val="0"/>
+                                          </p:val>
+                                        </p:tav>
+                                        <p:tav tm="100000">
+                                          <p:val>
+                                            <p:strVal val="#ppt_w"/>
+                                          </p:val>
+                                        </p:tav>
+                                      </p:tavLst>
+                                    </p:anim>
+                                    <p:anim calcmode="lin" valueType="num">
+                                      <p:cBhvr>
+                                        <p:cTn id="23" dur="500" fill="hold"/>
+                                        <p:tgtEl>
+                                          <p:spTgt spid="3">
+                                            <p:txEl>
+                                              <p:pRg st="2" end="2"/>
+                                            </p:txEl>
+                                          </p:spTgt>
+                                        </p:tgtEl>
+                                        <p:attrNameLst>
+                                          <p:attrName>ppt_h</p:attrName>
+                                        </p:attrNameLst>
+                                      </p:cBhvr>
+                                      <p:tavLst>
+                                        <p:tav tm="0">
+                                          <p:val>
+                                            <p:fltVal val="0"/>
+                                          </p:val>
+                                        </p:tav>
+                                        <p:tav tm="100000">
+                                          <p:val>
+                                            <p:strVal val="#ppt_h"/>
+                                          </p:val>
+                                        </p:tav>
+                                      </p:tavLst>
+                                    </p:anim>
+                                    <p:animEffect transition="in" filter="fade">
+                                      <p:cBhvr>
+                                        <p:cTn id="24" dur="500"/>
+                                        <p:tgtEl>
+                                          <p:spTgt spid="3">
+                                            <p:txEl>
+                                              <p:pRg st="2" end="2"/>
+                                            </p:txEl>
+                                          </p:spTgt>
+                                        </p:tgtEl>
+                                      </p:cBhvr>
+                                    </p:animEffect>
+                                  </p:childTnLst>
+                                </p:cTn>
+                              </p:par>
+                            </p:childTnLst>
+                          </p:cTn>
+                        </p:par>
+                      </p:childTnLst>
+                    </p:cTn>
+                  </p:par>
+                  <p:par>
+                    <p:cTn id="25" fill="hold">
+                      <p:stCondLst>
+                        <p:cond delay="indefinite"/>
+                      </p:stCondLst>
+                      <p:childTnLst>
+                        <p:par>
+                          <p:cTn id="26" fill="hold">
+                            <p:stCondLst>
+                              <p:cond delay="0"/>
+                            </p:stCondLst>
+                            <p:childTnLst>
+                              <p:par>
+                                <p:cTn id="27" presetID="53" presetClass="entr" presetSubtype="16" fill="hold" nodeType="clickEffect">
+                                  <p:stCondLst>
+                                    <p:cond delay="0"/>
+                                  </p:stCondLst>
+                                  <p:childTnLst>
+                                    <p:set>
+                                      <p:cBhvr>
+                                        <p:cTn id="28" dur="1" fill="hold">
+                                          <p:stCondLst>
+                                            <p:cond delay="0"/>
+                                          </p:stCondLst>
+                                        </p:cTn>
+                                        <p:tgtEl>
+                                          <p:spTgt spid="3">
+                                            <p:txEl>
+                                              <p:pRg st="3" end="3"/>
+                                            </p:txEl>
+                                          </p:spTgt>
+                                        </p:tgtEl>
+                                        <p:attrNameLst>
+                                          <p:attrName>style.visibility</p:attrName>
+                                        </p:attrNameLst>
+                                      </p:cBhvr>
+                                      <p:to>
+                                        <p:strVal val="visible"/>
+                                      </p:to>
+                                    </p:set>
+                                    <p:anim calcmode="lin" valueType="num">
+                                      <p:cBhvr>
+                                        <p:cTn id="29" dur="500" fill="hold"/>
+                                        <p:tgtEl>
+                                          <p:spTgt spid="3">
+                                            <p:txEl>
+                                              <p:pRg st="3" end="3"/>
+                                            </p:txEl>
+                                          </p:spTgt>
+                                        </p:tgtEl>
+                                        <p:attrNameLst>
+                                          <p:attrName>ppt_w</p:attrName>
+                                        </p:attrNameLst>
+                                      </p:cBhvr>
+                                      <p:tavLst>
+                                        <p:tav tm="0">
+                                          <p:val>
+                                            <p:fltVal val="0"/>
+                                          </p:val>
+                                        </p:tav>
+                                        <p:tav tm="100000">
+                                          <p:val>
+                                            <p:strVal val="#ppt_w"/>
+                                          </p:val>
+                                        </p:tav>
+                                      </p:tavLst>
+                                    </p:anim>
+                                    <p:anim calcmode="lin" valueType="num">
+                                      <p:cBhvr>
+                                        <p:cTn id="30" dur="500" fill="hold"/>
+                                        <p:tgtEl>
+                                          <p:spTgt spid="3">
+                                            <p:txEl>
+                                              <p:pRg st="3" end="3"/>
+                                            </p:txEl>
+                                          </p:spTgt>
+                                        </p:tgtEl>
+                                        <p:attrNameLst>
+                                          <p:attrName>ppt_h</p:attrName>
+                                        </p:attrNameLst>
+                                      </p:cBhvr>
+                                      <p:tavLst>
+                                        <p:tav tm="0">
+                                          <p:val>
+                                            <p:fltVal val="0"/>
+                                          </p:val>
+                                        </p:tav>
+                                        <p:tav tm="100000">
+                                          <p:val>
+                                            <p:strVal val="#ppt_h"/>
+                                          </p:val>
+                                        </p:tav>
+                                      </p:tavLst>
+                                    </p:anim>
+                                    <p:animEffect transition="in" filter="fade">
+                                      <p:cBhvr>
+                                        <p:cTn id="31" dur="500"/>
+                                        <p:tgtEl>
+                                          <p:spTgt spid="3">
+                                            <p:txEl>
+                                              <p:pRg st="3" end="3"/>
+                                            </p:txEl>
+                                          </p:spTgt>
+                                        </p:tgtEl>
+                                      </p:cBhvr>
+                                    </p:animEffect>
+                                  </p:childTnLst>
+                                </p:cTn>
+                              </p:par>
+                            </p:childTnLst>
+                          </p:cTn>
+                        </p:par>
+                      </p:childTnLst>
+                    </p:cTn>
+                  </p:par>
+                  <p:par>
+                    <p:cTn id="32" fill="hold">
+                      <p:stCondLst>
+                        <p:cond delay="indefinite"/>
+                      </p:stCondLst>
+                      <p:childTnLst>
+                        <p:par>
+                          <p:cTn id="33" fill="hold">
+                            <p:stCondLst>
+                              <p:cond delay="0"/>
+                            </p:stCondLst>
+                            <p:childTnLst>
+                              <p:par>
+                                <p:cTn id="34" presetID="6" presetClass="entr" presetSubtype="16" fill="hold" nodeType="clickEffect">
+                                  <p:stCondLst>
+                                    <p:cond delay="0"/>
+                                  </p:stCondLst>
+                                  <p:childTnLst>
+                                    <p:set>
+                                      <p:cBhvr>
+                                        <p:cTn id="35" dur="1" fill="hold">
+                                          <p:stCondLst>
+                                            <p:cond delay="0"/>
+                                          </p:stCondLst>
+                                        </p:cTn>
+                                        <p:tgtEl>
+                                          <p:spTgt spid="3">
+                                            <p:txEl>
+                                              <p:pRg st="4" end="4"/>
+                                            </p:txEl>
+                                          </p:spTgt>
+                                        </p:tgtEl>
+                                        <p:attrNameLst>
+                                          <p:attrName>style.visibility</p:attrName>
+                                        </p:attrNameLst>
+                                      </p:cBhvr>
+                                      <p:to>
+                                        <p:strVal val="visible"/>
+                                      </p:to>
+                                    </p:set>
+                                    <p:animEffect transition="in" filter="circle(in)">
+                                      <p:cBhvr>
+                                        <p:cTn id="36" dur="2000"/>
+                                        <p:tgtEl>
+                                          <p:spTgt spid="3">
+                                            <p:txEl>
+                                              <p:pRg st="4" end="4"/>
+                                            </p:txEl>
+                                          </p:spTgt>
+                                        </p:tgtEl>
+                                      </p:cBhvr>
+                                    </p:animEffect>
+                                  </p:childTnLst>
+                                </p:cTn>
+                              </p:par>
+                            </p:childTnLst>
+                          </p:cTn>
+                        </p:par>
+                      </p:childTnLst>
+                    </p:cTn>
+                  </p:par>
+                  <p:par>
+                    <p:cTn id="37" fill="hold">
+                      <p:stCondLst>
+                        <p:cond delay="indefinite"/>
+                      </p:stCondLst>
+                      <p:childTnLst>
+                        <p:par>
+                          <p:cTn id="38" fill="hold">
+                            <p:stCondLst>
+                              <p:cond delay="0"/>
+                            </p:stCondLst>
+                            <p:childTnLst>
+                              <p:par>
+                                <p:cTn id="39" presetID="6" presetClass="entr" presetSubtype="16" fill="hold" nodeType="clickEffect">
+                                  <p:stCondLst>
+                                    <p:cond delay="0"/>
+                                  </p:stCondLst>
+                                  <p:childTnLst>
+                                    <p:set>
+                                      <p:cBhvr>
+                                        <p:cTn id="40" dur="1" fill="hold">
+                                          <p:stCondLst>
+                                            <p:cond delay="0"/>
+                                          </p:stCondLst>
+                                        </p:cTn>
+                                        <p:tgtEl>
+                                          <p:spTgt spid="3">
+                                            <p:txEl>
+                                              <p:pRg st="5" end="5"/>
+                                            </p:txEl>
+                                          </p:spTgt>
+                                        </p:tgtEl>
+                                        <p:attrNameLst>
+                                          <p:attrName>style.visibility</p:attrName>
+                                        </p:attrNameLst>
+                                      </p:cBhvr>
+                                      <p:to>
+                                        <p:strVal val="visible"/>
+                                      </p:to>
+                                    </p:set>
+                                    <p:animEffect transition="in" filter="circle(in)">
+                                      <p:cBhvr>
+                                        <p:cTn id="41" dur="2000"/>
+                                        <p:tgtEl>
+                                          <p:spTgt spid="3">
+                                            <p:txEl>
+                                              <p:pRg st="5" end="5"/>
+                                            </p:txEl>
+                                          </p:spTgt>
+                                        </p:tgtEl>
+                                      </p:cBhvr>
+                                    </p:animEffect>
+                                  </p:childTnLst>
+                                </p:cTn>
+                              </p:par>
+                            </p:childTnLst>
+                          </p:cTn>
+                        </p:par>
+                      </p:childTnLst>
+                    </p:cTn>
+                  </p:par>
+                </p:childTnLst>
+              </p:cTn>
+              <p:prevCondLst>
+                <p:cond evt="onPrev" delay="0">
+                  <p:tgtEl>
+                    <p:sldTgt/>
+                  </p:tgtEl>
+                </p:cond>
+              </p:prevCondLst>
+              <p:nextCondLst>
+                <p:cond evt="onNext" delay="0">
+                  <p:tgtEl>
+                    <p:sldTgt/>
+                  </p:tgtEl>
+                </p:cond>
+              </p:nextCondLst>
+            </p:seq>
+          </p:childTnLst>
+        </p:cTn>
+      </p:par>
+    </p:tnLst>
+  </p:timing>
 </p:sld>
 </file>
 
@@ -8567,6 +9903,36 @@
           </a:p>
         </p:txBody>
       </p:sp>
+      <p:pic>
+        <p:nvPicPr>
+          <p:cNvPr id="4" name="Picture 3"/>
+          <p:cNvPicPr>
+            <a:picLocks noChangeAspect="1"/>
+          </p:cNvPicPr>
+          <p:nvPr/>
+        </p:nvPicPr>
+        <p:blipFill>
+          <a:blip r:embed="rId3" cstate="print">
+            <a:extLst>
+              <a:ext uri="{28A0092B-C50C-407E-A947-70E740481C1C}">
+                <a14:useLocalDpi xmlns:a14="http://schemas.microsoft.com/office/drawing/2010/main" val="0"/>
+              </a:ext>
+            </a:extLst>
+          </a:blip>
+          <a:stretch>
+            <a:fillRect/>
+          </a:stretch>
+        </p:blipFill>
+        <p:spPr>
+          <a:xfrm>
+            <a:off x="-1" y="5291301"/>
+            <a:ext cx="2785241" cy="1566699"/>
+          </a:xfrm>
+          <a:prstGeom prst="rect">
+            <a:avLst/>
+          </a:prstGeom>
+        </p:spPr>
+      </p:pic>
     </p:spTree>
     <p:extLst>
       <p:ext uri="{BB962C8B-B14F-4D97-AF65-F5344CB8AC3E}">
@@ -8589,6 +9955,13 @@
       </p:transition>
     </mc:Fallback>
   </mc:AlternateContent>
+  <p:timing>
+    <p:tnLst>
+      <p:par>
+        <p:cTn id="1" dur="indefinite" restart="never" nodeType="tmRoot"/>
+      </p:par>
+    </p:tnLst>
+  </p:timing>
 </p:sld>
 </file>
 
@@ -9767,9 +11140,17 @@
               <a:rPr lang="en-GB" dirty="0"/>
               <a:t>Thank you for listening!</a:t>
             </a:r>
+            <a:r>
+              <a:rPr lang="en-GB" u="sng" dirty="0"/>
+              <a:t/>
+            </a:r>
             <a:br>
               <a:rPr lang="en-GB" u="sng" dirty="0"/>
             </a:br>
+            <a:r>
+              <a:rPr lang="en-GB" u="sng" dirty="0"/>
+              <a:t/>
+            </a:r>
             <a:br>
               <a:rPr lang="en-GB" u="sng" dirty="0"/>
             </a:br>
@@ -22126,6 +23507,66 @@
           <a:chExt cx="0" cy="0"/>
         </a:xfrm>
       </p:grpSpPr>
+      <p:pic>
+        <p:nvPicPr>
+          <p:cNvPr id="15" name="Picture 14"/>
+          <p:cNvPicPr>
+            <a:picLocks noChangeAspect="1"/>
+          </p:cNvPicPr>
+          <p:nvPr/>
+        </p:nvPicPr>
+        <p:blipFill>
+          <a:blip r:embed="rId7">
+            <a:extLst>
+              <a:ext uri="{28A0092B-C50C-407E-A947-70E740481C1C}">
+                <a14:useLocalDpi xmlns:a14="http://schemas.microsoft.com/office/drawing/2010/main" val="0"/>
+              </a:ext>
+            </a:extLst>
+          </a:blip>
+          <a:stretch>
+            <a:fillRect/>
+          </a:stretch>
+        </p:blipFill>
+        <p:spPr>
+          <a:xfrm rot="10800000">
+            <a:off x="6593811" y="6858000"/>
+            <a:ext cx="2365050" cy="2365050"/>
+          </a:xfrm>
+          <a:prstGeom prst="rect">
+            <a:avLst/>
+          </a:prstGeom>
+        </p:spPr>
+      </p:pic>
+      <p:pic>
+        <p:nvPicPr>
+          <p:cNvPr id="14" name="Picture 13"/>
+          <p:cNvPicPr>
+            <a:picLocks noChangeAspect="1"/>
+          </p:cNvPicPr>
+          <p:nvPr/>
+        </p:nvPicPr>
+        <p:blipFill>
+          <a:blip r:embed="rId8">
+            <a:extLst>
+              <a:ext uri="{28A0092B-C50C-407E-A947-70E740481C1C}">
+                <a14:useLocalDpi xmlns:a14="http://schemas.microsoft.com/office/drawing/2010/main" val="0"/>
+              </a:ext>
+            </a:extLst>
+          </a:blip>
+          <a:stretch>
+            <a:fillRect/>
+          </a:stretch>
+        </p:blipFill>
+        <p:spPr>
+          <a:xfrm>
+            <a:off x="3023029" y="-2596476"/>
+            <a:ext cx="2504090" cy="2504090"/>
+          </a:xfrm>
+          <a:prstGeom prst="rect">
+            <a:avLst/>
+          </a:prstGeom>
+        </p:spPr>
+      </p:pic>
       <p:sp>
         <p:nvSpPr>
           <p:cNvPr id="2" name="Title 1"/>
@@ -22151,42 +23592,388 @@
       </p:sp>
       <p:sp>
         <p:nvSpPr>
-          <p:cNvPr id="3" name="Content Placeholder 2"/>
-          <p:cNvSpPr>
-            <a:spLocks noGrp="1"/>
-          </p:cNvSpPr>
+          <p:cNvPr id="4" name="TextBox 3"/>
+          <p:cNvSpPr txBox="1"/>
+          <p:nvPr/>
+        </p:nvSpPr>
+        <p:spPr>
+          <a:xfrm>
+            <a:off x="2204915" y="1906172"/>
+            <a:ext cx="7781544" cy="384721"/>
+          </a:xfrm>
+          <a:prstGeom prst="rect">
+            <a:avLst/>
+          </a:prstGeom>
+        </p:spPr>
+        <p:style>
+          <a:lnRef idx="2">
+            <a:schemeClr val="accent1">
+              <a:shade val="50000"/>
+            </a:schemeClr>
+          </a:lnRef>
+          <a:fillRef idx="1">
+            <a:schemeClr val="accent1"/>
+          </a:fillRef>
+          <a:effectRef idx="0">
+            <a:schemeClr val="accent1"/>
+          </a:effectRef>
+          <a:fontRef idx="minor">
+            <a:schemeClr val="lt1"/>
+          </a:fontRef>
+        </p:style>
+        <p:txBody>
+          <a:bodyPr wrap="square" rtlCol="0">
+            <a:spAutoFit/>
+          </a:bodyPr>
+          <a:lstStyle/>
+          <a:p>
+            <a:r>
+              <a:rPr lang="en-GB" dirty="0"/>
+              <a:t>All the non music </a:t>
+            </a:r>
+            <a:r>
+              <a:rPr lang="en-GB" sz="1900" dirty="0"/>
+              <a:t>audio</a:t>
+            </a:r>
+            <a:r>
+              <a:rPr lang="en-GB" dirty="0"/>
+              <a:t> was </a:t>
+            </a:r>
+            <a:r>
+              <a:rPr lang="en-GB" dirty="0" smtClean="0"/>
+              <a:t>created </a:t>
+            </a:r>
+            <a:r>
+              <a:rPr lang="en-GB" dirty="0"/>
+              <a:t>by </a:t>
+            </a:r>
+            <a:r>
+              <a:rPr lang="en-GB" dirty="0" err="1"/>
+              <a:t>K.Melville</a:t>
+            </a:r>
+            <a:r>
+              <a:rPr lang="en-GB" dirty="0"/>
+              <a:t> using </a:t>
+            </a:r>
+            <a:r>
+              <a:rPr lang="en-GB" dirty="0" smtClean="0"/>
+              <a:t>Audacity.</a:t>
+            </a:r>
+            <a:endParaRPr lang="en-GB" dirty="0"/>
+          </a:p>
+        </p:txBody>
+      </p:sp>
+      <p:sp>
+        <p:nvSpPr>
+          <p:cNvPr id="5" name="TextBox 4"/>
+          <p:cNvSpPr txBox="1"/>
+          <p:nvPr/>
+        </p:nvSpPr>
+        <p:spPr>
+          <a:xfrm>
+            <a:off x="2204915" y="2350463"/>
+            <a:ext cx="7781544" cy="369332"/>
+          </a:xfrm>
+          <a:prstGeom prst="rect">
+            <a:avLst/>
+          </a:prstGeom>
+        </p:spPr>
+        <p:style>
+          <a:lnRef idx="2">
+            <a:schemeClr val="accent2">
+              <a:shade val="50000"/>
+            </a:schemeClr>
+          </a:lnRef>
+          <a:fillRef idx="1">
+            <a:schemeClr val="accent2"/>
+          </a:fillRef>
+          <a:effectRef idx="0">
+            <a:schemeClr val="accent2"/>
+          </a:effectRef>
+          <a:fontRef idx="minor">
+            <a:schemeClr val="lt1"/>
+          </a:fontRef>
+        </p:style>
+        <p:txBody>
+          <a:bodyPr wrap="square" rtlCol="0">
+            <a:spAutoFit/>
+          </a:bodyPr>
+          <a:lstStyle/>
+          <a:p>
+            <a:r>
+              <a:rPr lang="en-GB" dirty="0"/>
+              <a:t>9 audio files created for the </a:t>
+            </a:r>
+            <a:r>
+              <a:rPr lang="en-GB" dirty="0" smtClean="0"/>
+              <a:t>Game.</a:t>
+            </a:r>
+            <a:endParaRPr lang="en-GB" dirty="0"/>
+          </a:p>
+        </p:txBody>
+      </p:sp>
+      <p:pic>
+        <p:nvPicPr>
+          <p:cNvPr id="6" name="player_Jump">
+            <a:hlinkClick r:id="" action="ppaction://media"/>
+          </p:cNvPr>
+          <p:cNvPicPr>
+            <a:picLocks noChangeAspect="1"/>
+          </p:cNvPicPr>
           <p:nvPr>
-            <p:ph sz="quarter" idx="13"/>
+            <a:audioFile r:link="rId2"/>
+            <p:extLst>
+              <p:ext uri="{DAA4B4D4-6D71-4841-9C94-3DE7FCFB9230}">
+                <p14:media xmlns:p14="http://schemas.microsoft.com/office/powerpoint/2010/main" r:embed="rId1"/>
+              </p:ext>
+            </p:extLst>
           </p:nvPr>
+        </p:nvPicPr>
+        <p:blipFill>
+          <a:blip r:embed="rId9"/>
+          <a:stretch>
+            <a:fillRect/>
+          </a:stretch>
+        </p:blipFill>
+        <p:spPr>
+          <a:xfrm>
+            <a:off x="3970274" y="3060388"/>
+            <a:ext cx="609600" cy="609600"/>
+          </a:xfrm>
+          <a:prstGeom prst="rect">
+            <a:avLst/>
+          </a:prstGeom>
+        </p:spPr>
+      </p:pic>
+      <p:pic>
+        <p:nvPicPr>
+          <p:cNvPr id="7" name="player_death">
+            <a:hlinkClick r:id="" action="ppaction://media"/>
+          </p:cNvPr>
+          <p:cNvPicPr>
+            <a:picLocks noChangeAspect="1"/>
+          </p:cNvPicPr>
+          <p:nvPr>
+            <a:audioFile r:link="rId4"/>
+            <p:extLst>
+              <p:ext uri="{DAA4B4D4-6D71-4841-9C94-3DE7FCFB9230}">
+                <p14:media xmlns:p14="http://schemas.microsoft.com/office/powerpoint/2010/main" r:embed="rId3"/>
+              </p:ext>
+            </p:extLst>
+          </p:nvPr>
+        </p:nvPicPr>
+        <p:blipFill>
+          <a:blip r:embed="rId9"/>
+          <a:stretch>
+            <a:fillRect/>
+          </a:stretch>
+        </p:blipFill>
+        <p:spPr>
+          <a:xfrm>
+            <a:off x="7471537" y="3060388"/>
+            <a:ext cx="609600" cy="609600"/>
+          </a:xfrm>
+          <a:prstGeom prst="rect">
+            <a:avLst/>
+          </a:prstGeom>
+        </p:spPr>
+      </p:pic>
+      <p:sp>
+        <p:nvSpPr>
+          <p:cNvPr id="8" name="TextBox 7"/>
+          <p:cNvSpPr txBox="1"/>
+          <p:nvPr/>
         </p:nvSpPr>
-        <p:spPr/>
+        <p:spPr>
+          <a:xfrm>
+            <a:off x="2204915" y="4344075"/>
+            <a:ext cx="7781544" cy="369332"/>
+          </a:xfrm>
+          <a:prstGeom prst="rect">
+            <a:avLst/>
+          </a:prstGeom>
+        </p:spPr>
+        <p:style>
+          <a:lnRef idx="2">
+            <a:schemeClr val="accent4">
+              <a:shade val="50000"/>
+            </a:schemeClr>
+          </a:lnRef>
+          <a:fillRef idx="1">
+            <a:schemeClr val="accent4"/>
+          </a:fillRef>
+          <a:effectRef idx="0">
+            <a:schemeClr val="accent4"/>
+          </a:effectRef>
+          <a:fontRef idx="minor">
+            <a:schemeClr val="lt1"/>
+          </a:fontRef>
+        </p:style>
         <p:txBody>
-          <a:bodyPr/>
+          <a:bodyPr wrap="square" rtlCol="0">
+            <a:spAutoFit/>
+          </a:bodyPr>
           <a:lstStyle/>
           <a:p>
             <a:r>
               <a:rPr lang="en-GB" dirty="0"/>
-              <a:t>[Discuss audio – how it was created (e.g. via Audacity) – multiple sounds per level? </a:t>
-            </a:r>
-          </a:p>
+              <a:t>Music will all be sourced from chiptunes giving the game a nostalgic </a:t>
+            </a:r>
+            <a:r>
+              <a:rPr lang="en-GB" dirty="0" smtClean="0"/>
+              <a:t>8-bit sound.</a:t>
+            </a:r>
+            <a:endParaRPr lang="en-GB" dirty="0"/>
+          </a:p>
+        </p:txBody>
+      </p:sp>
+      <p:sp>
+        <p:nvSpPr>
+          <p:cNvPr id="10" name="TextBox 9"/>
+          <p:cNvSpPr txBox="1"/>
+          <p:nvPr/>
+        </p:nvSpPr>
+        <p:spPr>
+          <a:xfrm>
+            <a:off x="2204915" y="4772977"/>
+            <a:ext cx="7781544" cy="369332"/>
+          </a:xfrm>
+          <a:prstGeom prst="rect">
+            <a:avLst/>
+          </a:prstGeom>
+        </p:spPr>
+        <p:style>
+          <a:lnRef idx="2">
+            <a:schemeClr val="accent6">
+              <a:shade val="50000"/>
+            </a:schemeClr>
+          </a:lnRef>
+          <a:fillRef idx="1">
+            <a:schemeClr val="accent6"/>
+          </a:fillRef>
+          <a:effectRef idx="0">
+            <a:schemeClr val="accent6"/>
+          </a:effectRef>
+          <a:fontRef idx="minor">
+            <a:schemeClr val="lt1"/>
+          </a:fontRef>
+        </p:style>
+        <p:txBody>
+          <a:bodyPr wrap="square" rtlCol="0">
+            <a:spAutoFit/>
+          </a:bodyPr>
+          <a:lstStyle/>
           <a:p>
             <a:r>
               <a:rPr lang="en-GB" dirty="0"/>
-              <a:t>[Samples of the sounds]</a:t>
-            </a:r>
-          </a:p>
-          <a:p>
-            <a:r>
-              <a:rPr lang="en-GB" dirty="0"/>
-              <a:t>[Discuss ease of use of the software? – how easy to integrate with Unity?]</a:t>
-            </a:r>
+              <a:t>Audacity was an easy to use free software </a:t>
+            </a:r>
+            <a:r>
+              <a:rPr lang="en-GB" dirty="0" smtClean="0"/>
+              <a:t>package.</a:t>
+            </a:r>
+            <a:endParaRPr lang="en-GB" dirty="0"/>
+          </a:p>
+        </p:txBody>
+      </p:sp>
+      <p:sp>
+        <p:nvSpPr>
+          <p:cNvPr id="12" name="TextBox 11"/>
+          <p:cNvSpPr txBox="1"/>
+          <p:nvPr/>
+        </p:nvSpPr>
+        <p:spPr>
+          <a:xfrm>
+            <a:off x="3334397" y="3162603"/>
+            <a:ext cx="2112579" cy="369332"/>
+          </a:xfrm>
+          <a:prstGeom prst="rect">
+            <a:avLst/>
+          </a:prstGeom>
+        </p:spPr>
+        <p:style>
+          <a:lnRef idx="1">
+            <a:schemeClr val="accent3"/>
+          </a:lnRef>
+          <a:fillRef idx="2">
+            <a:schemeClr val="accent3"/>
+          </a:fillRef>
+          <a:effectRef idx="1">
+            <a:schemeClr val="accent3"/>
+          </a:effectRef>
+          <a:fontRef idx="minor">
+            <a:schemeClr val="dk1"/>
+          </a:fontRef>
+        </p:style>
+        <p:txBody>
+          <a:bodyPr wrap="square" rtlCol="0">
+            <a:spAutoFit/>
+          </a:bodyPr>
+          <a:lstStyle/>
+          <a:p>
+            <a:r>
+              <a:rPr lang="en-GB" dirty="0" err="1" smtClean="0"/>
+              <a:t>Player_jump</a:t>
+            </a:r>
+            <a:r>
+              <a:rPr lang="en-GB" dirty="0" smtClean="0"/>
+              <a:t> Sound</a:t>
+            </a:r>
+            <a:endParaRPr lang="en-GB" dirty="0"/>
+          </a:p>
+        </p:txBody>
+      </p:sp>
+      <p:sp>
+        <p:nvSpPr>
+          <p:cNvPr id="13" name="TextBox 12"/>
+          <p:cNvSpPr txBox="1"/>
+          <p:nvPr/>
+        </p:nvSpPr>
+        <p:spPr>
+          <a:xfrm>
+            <a:off x="6720047" y="3167582"/>
+            <a:ext cx="2112579" cy="369332"/>
+          </a:xfrm>
+          <a:prstGeom prst="rect">
+            <a:avLst/>
+          </a:prstGeom>
+        </p:spPr>
+        <p:style>
+          <a:lnRef idx="1">
+            <a:schemeClr val="accent5"/>
+          </a:lnRef>
+          <a:fillRef idx="2">
+            <a:schemeClr val="accent5"/>
+          </a:fillRef>
+          <a:effectRef idx="1">
+            <a:schemeClr val="accent5"/>
+          </a:effectRef>
+          <a:fontRef idx="minor">
+            <a:schemeClr val="dk1"/>
+          </a:fontRef>
+        </p:style>
+        <p:txBody>
+          <a:bodyPr wrap="square" rtlCol="0">
+            <a:spAutoFit/>
+          </a:bodyPr>
+          <a:lstStyle/>
+          <a:p>
+            <a:r>
+              <a:rPr lang="en-GB" dirty="0" err="1" smtClean="0"/>
+              <a:t>Player_death</a:t>
+            </a:r>
+            <a:r>
+              <a:rPr lang="en-GB" dirty="0" smtClean="0"/>
+              <a:t> Sound</a:t>
+            </a:r>
+            <a:endParaRPr lang="en-GB" dirty="0"/>
           </a:p>
         </p:txBody>
       </p:sp>
     </p:spTree>
     <p:extLst>
       <p:ext uri="{BB962C8B-B14F-4D97-AF65-F5344CB8AC3E}">
-        <p14:creationId xmlns:p14="http://schemas.microsoft.com/office/powerpoint/2010/main" val="3194970854"/>
+        <p14:creationId xmlns:p14="http://schemas.microsoft.com/office/powerpoint/2010/main" val="3372747788"/>
       </p:ext>
     </p:extLst>
   </p:cSld>
@@ -22205,6 +23992,644 @@
       </p:transition>
     </mc:Fallback>
   </mc:AlternateContent>
+  <p:timing>
+    <p:tnLst>
+      <p:par>
+        <p:cTn id="1" dur="indefinite" restart="never" nodeType="tmRoot">
+          <p:childTnLst>
+            <p:seq concurrent="1" nextAc="seek">
+              <p:cTn id="2" dur="indefinite" nodeType="mainSeq">
+                <p:childTnLst>
+                  <p:par>
+                    <p:cTn id="3" fill="hold">
+                      <p:stCondLst>
+                        <p:cond delay="indefinite"/>
+                      </p:stCondLst>
+                      <p:childTnLst>
+                        <p:par>
+                          <p:cTn id="4" fill="hold">
+                            <p:stCondLst>
+                              <p:cond delay="0"/>
+                            </p:stCondLst>
+                            <p:childTnLst>
+                              <p:par>
+                                <p:cTn id="5" presetID="22" presetClass="entr" presetSubtype="4" fill="hold" grpId="0" nodeType="clickEffect">
+                                  <p:stCondLst>
+                                    <p:cond delay="0"/>
+                                  </p:stCondLst>
+                                  <p:childTnLst>
+                                    <p:set>
+                                      <p:cBhvr>
+                                        <p:cTn id="6" dur="1" fill="hold">
+                                          <p:stCondLst>
+                                            <p:cond delay="0"/>
+                                          </p:stCondLst>
+                                        </p:cTn>
+                                        <p:tgtEl>
+                                          <p:spTgt spid="4"/>
+                                        </p:tgtEl>
+                                        <p:attrNameLst>
+                                          <p:attrName>style.visibility</p:attrName>
+                                        </p:attrNameLst>
+                                      </p:cBhvr>
+                                      <p:to>
+                                        <p:strVal val="visible"/>
+                                      </p:to>
+                                    </p:set>
+                                    <p:animEffect transition="in" filter="wipe(down)">
+                                      <p:cBhvr>
+                                        <p:cTn id="7" dur="500"/>
+                                        <p:tgtEl>
+                                          <p:spTgt spid="4"/>
+                                        </p:tgtEl>
+                                      </p:cBhvr>
+                                    </p:animEffect>
+                                  </p:childTnLst>
+                                </p:cTn>
+                              </p:par>
+                            </p:childTnLst>
+                          </p:cTn>
+                        </p:par>
+                      </p:childTnLst>
+                    </p:cTn>
+                  </p:par>
+                  <p:par>
+                    <p:cTn id="8" fill="hold">
+                      <p:stCondLst>
+                        <p:cond delay="indefinite"/>
+                      </p:stCondLst>
+                      <p:childTnLst>
+                        <p:par>
+                          <p:cTn id="9" fill="hold">
+                            <p:stCondLst>
+                              <p:cond delay="0"/>
+                            </p:stCondLst>
+                            <p:childTnLst>
+                              <p:par>
+                                <p:cTn id="10" presetID="22" presetClass="entr" presetSubtype="1" fill="hold" grpId="0" nodeType="clickEffect">
+                                  <p:stCondLst>
+                                    <p:cond delay="0"/>
+                                  </p:stCondLst>
+                                  <p:childTnLst>
+                                    <p:set>
+                                      <p:cBhvr>
+                                        <p:cTn id="11" dur="1" fill="hold">
+                                          <p:stCondLst>
+                                            <p:cond delay="0"/>
+                                          </p:stCondLst>
+                                        </p:cTn>
+                                        <p:tgtEl>
+                                          <p:spTgt spid="5"/>
+                                        </p:tgtEl>
+                                        <p:attrNameLst>
+                                          <p:attrName>style.visibility</p:attrName>
+                                        </p:attrNameLst>
+                                      </p:cBhvr>
+                                      <p:to>
+                                        <p:strVal val="visible"/>
+                                      </p:to>
+                                    </p:set>
+                                    <p:animEffect transition="in" filter="wipe(up)">
+                                      <p:cBhvr>
+                                        <p:cTn id="12" dur="500"/>
+                                        <p:tgtEl>
+                                          <p:spTgt spid="5"/>
+                                        </p:tgtEl>
+                                      </p:cBhvr>
+                                    </p:animEffect>
+                                  </p:childTnLst>
+                                </p:cTn>
+                              </p:par>
+                            </p:childTnLst>
+                          </p:cTn>
+                        </p:par>
+                      </p:childTnLst>
+                    </p:cTn>
+                  </p:par>
+                  <p:par>
+                    <p:cTn id="13" fill="hold">
+                      <p:stCondLst>
+                        <p:cond delay="indefinite"/>
+                      </p:stCondLst>
+                      <p:childTnLst>
+                        <p:par>
+                          <p:cTn id="14" fill="hold">
+                            <p:stCondLst>
+                              <p:cond delay="0"/>
+                            </p:stCondLst>
+                            <p:childTnLst>
+                              <p:par>
+                                <p:cTn id="15" presetID="10" presetClass="entr" presetSubtype="0" fill="hold" grpId="0" nodeType="clickEffect">
+                                  <p:stCondLst>
+                                    <p:cond delay="0"/>
+                                  </p:stCondLst>
+                                  <p:childTnLst>
+                                    <p:set>
+                                      <p:cBhvr>
+                                        <p:cTn id="16" dur="1" fill="hold">
+                                          <p:stCondLst>
+                                            <p:cond delay="0"/>
+                                          </p:stCondLst>
+                                        </p:cTn>
+                                        <p:tgtEl>
+                                          <p:spTgt spid="12"/>
+                                        </p:tgtEl>
+                                        <p:attrNameLst>
+                                          <p:attrName>style.visibility</p:attrName>
+                                        </p:attrNameLst>
+                                      </p:cBhvr>
+                                      <p:to>
+                                        <p:strVal val="visible"/>
+                                      </p:to>
+                                    </p:set>
+                                    <p:animEffect transition="in" filter="fade">
+                                      <p:cBhvr>
+                                        <p:cTn id="17" dur="500"/>
+                                        <p:tgtEl>
+                                          <p:spTgt spid="12"/>
+                                        </p:tgtEl>
+                                      </p:cBhvr>
+                                    </p:animEffect>
+                                  </p:childTnLst>
+                                </p:cTn>
+                              </p:par>
+                            </p:childTnLst>
+                          </p:cTn>
+                        </p:par>
+                        <p:par>
+                          <p:cTn id="18" fill="hold">
+                            <p:stCondLst>
+                              <p:cond delay="500"/>
+                            </p:stCondLst>
+                            <p:childTnLst>
+                              <p:par>
+                                <p:cTn id="19" presetID="1" presetClass="mediacall" presetSubtype="0" fill="hold" nodeType="afterEffect">
+                                  <p:stCondLst>
+                                    <p:cond delay="0"/>
+                                  </p:stCondLst>
+                                  <p:childTnLst>
+                                    <p:cmd type="call" cmd="playFrom(0.0)">
+                                      <p:cBhvr>
+                                        <p:cTn id="20" dur="1128" fill="hold"/>
+                                        <p:tgtEl>
+                                          <p:spTgt spid="6"/>
+                                        </p:tgtEl>
+                                      </p:cBhvr>
+                                    </p:cmd>
+                                  </p:childTnLst>
+                                </p:cTn>
+                              </p:par>
+                              <p:par>
+                                <p:cTn id="21" presetID="2" presetClass="entr" presetSubtype="4" fill="hold" nodeType="withEffect">
+                                  <p:stCondLst>
+                                    <p:cond delay="0"/>
+                                  </p:stCondLst>
+                                  <p:childTnLst>
+                                    <p:set>
+                                      <p:cBhvr>
+                                        <p:cTn id="22" dur="1" fill="hold">
+                                          <p:stCondLst>
+                                            <p:cond delay="0"/>
+                                          </p:stCondLst>
+                                        </p:cTn>
+                                        <p:tgtEl>
+                                          <p:spTgt spid="14"/>
+                                        </p:tgtEl>
+                                        <p:attrNameLst>
+                                          <p:attrName>style.visibility</p:attrName>
+                                        </p:attrNameLst>
+                                      </p:cBhvr>
+                                      <p:to>
+                                        <p:strVal val="visible"/>
+                                      </p:to>
+                                    </p:set>
+                                    <p:anim calcmode="lin" valueType="num">
+                                      <p:cBhvr additive="base">
+                                        <p:cTn id="23" dur="250" fill="hold"/>
+                                        <p:tgtEl>
+                                          <p:spTgt spid="14"/>
+                                        </p:tgtEl>
+                                        <p:attrNameLst>
+                                          <p:attrName>ppt_x</p:attrName>
+                                        </p:attrNameLst>
+                                      </p:cBhvr>
+                                      <p:tavLst>
+                                        <p:tav tm="0">
+                                          <p:val>
+                                            <p:strVal val="#ppt_x"/>
+                                          </p:val>
+                                        </p:tav>
+                                        <p:tav tm="100000">
+                                          <p:val>
+                                            <p:strVal val="#ppt_x"/>
+                                          </p:val>
+                                        </p:tav>
+                                      </p:tavLst>
+                                    </p:anim>
+                                    <p:anim calcmode="lin" valueType="num">
+                                      <p:cBhvr additive="base">
+                                        <p:cTn id="24" dur="250" fill="hold"/>
+                                        <p:tgtEl>
+                                          <p:spTgt spid="14"/>
+                                        </p:tgtEl>
+                                        <p:attrNameLst>
+                                          <p:attrName>ppt_y</p:attrName>
+                                        </p:attrNameLst>
+                                      </p:cBhvr>
+                                      <p:tavLst>
+                                        <p:tav tm="0">
+                                          <p:val>
+                                            <p:strVal val="1+#ppt_h/2"/>
+                                          </p:val>
+                                        </p:tav>
+                                        <p:tav tm="100000">
+                                          <p:val>
+                                            <p:strVal val="#ppt_y"/>
+                                          </p:val>
+                                        </p:tav>
+                                      </p:tavLst>
+                                    </p:anim>
+                                  </p:childTnLst>
+                                </p:cTn>
+                              </p:par>
+                            </p:childTnLst>
+                          </p:cTn>
+                        </p:par>
+                      </p:childTnLst>
+                    </p:cTn>
+                  </p:par>
+                  <p:par>
+                    <p:cTn id="25" fill="hold">
+                      <p:stCondLst>
+                        <p:cond delay="indefinite"/>
+                      </p:stCondLst>
+                      <p:childTnLst>
+                        <p:par>
+                          <p:cTn id="26" fill="hold">
+                            <p:stCondLst>
+                              <p:cond delay="0"/>
+                            </p:stCondLst>
+                            <p:childTnLst>
+                              <p:par>
+                                <p:cTn id="27" presetID="10" presetClass="entr" presetSubtype="0" fill="hold" grpId="0" nodeType="clickEffect">
+                                  <p:stCondLst>
+                                    <p:cond delay="0"/>
+                                  </p:stCondLst>
+                                  <p:childTnLst>
+                                    <p:set>
+                                      <p:cBhvr>
+                                        <p:cTn id="28" dur="1" fill="hold">
+                                          <p:stCondLst>
+                                            <p:cond delay="0"/>
+                                          </p:stCondLst>
+                                        </p:cTn>
+                                        <p:tgtEl>
+                                          <p:spTgt spid="13"/>
+                                        </p:tgtEl>
+                                        <p:attrNameLst>
+                                          <p:attrName>style.visibility</p:attrName>
+                                        </p:attrNameLst>
+                                      </p:cBhvr>
+                                      <p:to>
+                                        <p:strVal val="visible"/>
+                                      </p:to>
+                                    </p:set>
+                                    <p:animEffect transition="in" filter="fade">
+                                      <p:cBhvr>
+                                        <p:cTn id="29" dur="500"/>
+                                        <p:tgtEl>
+                                          <p:spTgt spid="13"/>
+                                        </p:tgtEl>
+                                      </p:cBhvr>
+                                    </p:animEffect>
+                                  </p:childTnLst>
+                                </p:cTn>
+                              </p:par>
+                            </p:childTnLst>
+                          </p:cTn>
+                        </p:par>
+                        <p:par>
+                          <p:cTn id="30" fill="hold">
+                            <p:stCondLst>
+                              <p:cond delay="500"/>
+                            </p:stCondLst>
+                            <p:childTnLst>
+                              <p:par>
+                                <p:cTn id="31" presetID="1" presetClass="mediacall" presetSubtype="0" fill="hold" nodeType="afterEffect">
+                                  <p:stCondLst>
+                                    <p:cond delay="0"/>
+                                  </p:stCondLst>
+                                  <p:childTnLst>
+                                    <p:cmd type="call" cmd="playFrom(0.0)">
+                                      <p:cBhvr>
+                                        <p:cTn id="32" dur="1255" fill="hold"/>
+                                        <p:tgtEl>
+                                          <p:spTgt spid="7"/>
+                                        </p:tgtEl>
+                                      </p:cBhvr>
+                                    </p:cmd>
+                                  </p:childTnLst>
+                                </p:cTn>
+                              </p:par>
+                              <p:par>
+                                <p:cTn id="33" presetID="2" presetClass="entr" presetSubtype="1" fill="hold" nodeType="withEffect">
+                                  <p:stCondLst>
+                                    <p:cond delay="0"/>
+                                  </p:stCondLst>
+                                  <p:childTnLst>
+                                    <p:set>
+                                      <p:cBhvr>
+                                        <p:cTn id="34" dur="1" fill="hold">
+                                          <p:stCondLst>
+                                            <p:cond delay="0"/>
+                                          </p:stCondLst>
+                                        </p:cTn>
+                                        <p:tgtEl>
+                                          <p:spTgt spid="15"/>
+                                        </p:tgtEl>
+                                        <p:attrNameLst>
+                                          <p:attrName>style.visibility</p:attrName>
+                                        </p:attrNameLst>
+                                      </p:cBhvr>
+                                      <p:to>
+                                        <p:strVal val="visible"/>
+                                      </p:to>
+                                    </p:set>
+                                    <p:anim calcmode="lin" valueType="num">
+                                      <p:cBhvr additive="base">
+                                        <p:cTn id="35" dur="250" fill="hold"/>
+                                        <p:tgtEl>
+                                          <p:spTgt spid="15"/>
+                                        </p:tgtEl>
+                                        <p:attrNameLst>
+                                          <p:attrName>ppt_x</p:attrName>
+                                        </p:attrNameLst>
+                                      </p:cBhvr>
+                                      <p:tavLst>
+                                        <p:tav tm="0">
+                                          <p:val>
+                                            <p:strVal val="#ppt_x"/>
+                                          </p:val>
+                                        </p:tav>
+                                        <p:tav tm="100000">
+                                          <p:val>
+                                            <p:strVal val="#ppt_x"/>
+                                          </p:val>
+                                        </p:tav>
+                                      </p:tavLst>
+                                    </p:anim>
+                                    <p:anim calcmode="lin" valueType="num">
+                                      <p:cBhvr additive="base">
+                                        <p:cTn id="36" dur="250" fill="hold"/>
+                                        <p:tgtEl>
+                                          <p:spTgt spid="15"/>
+                                        </p:tgtEl>
+                                        <p:attrNameLst>
+                                          <p:attrName>ppt_y</p:attrName>
+                                        </p:attrNameLst>
+                                      </p:cBhvr>
+                                      <p:tavLst>
+                                        <p:tav tm="0">
+                                          <p:val>
+                                            <p:strVal val="0-#ppt_h/2"/>
+                                          </p:val>
+                                        </p:tav>
+                                        <p:tav tm="100000">
+                                          <p:val>
+                                            <p:strVal val="#ppt_y"/>
+                                          </p:val>
+                                        </p:tav>
+                                      </p:tavLst>
+                                    </p:anim>
+                                  </p:childTnLst>
+                                </p:cTn>
+                              </p:par>
+                            </p:childTnLst>
+                          </p:cTn>
+                        </p:par>
+                      </p:childTnLst>
+                    </p:cTn>
+                  </p:par>
+                  <p:par>
+                    <p:cTn id="37" fill="hold">
+                      <p:stCondLst>
+                        <p:cond delay="indefinite"/>
+                      </p:stCondLst>
+                      <p:childTnLst>
+                        <p:par>
+                          <p:cTn id="38" fill="hold">
+                            <p:stCondLst>
+                              <p:cond delay="0"/>
+                            </p:stCondLst>
+                            <p:childTnLst>
+                              <p:par>
+                                <p:cTn id="39" presetID="14" presetClass="entr" presetSubtype="10" fill="hold" grpId="0" nodeType="clickEffect">
+                                  <p:stCondLst>
+                                    <p:cond delay="0"/>
+                                  </p:stCondLst>
+                                  <p:childTnLst>
+                                    <p:set>
+                                      <p:cBhvr>
+                                        <p:cTn id="40" dur="1" fill="hold">
+                                          <p:stCondLst>
+                                            <p:cond delay="0"/>
+                                          </p:stCondLst>
+                                        </p:cTn>
+                                        <p:tgtEl>
+                                          <p:spTgt spid="8"/>
+                                        </p:tgtEl>
+                                        <p:attrNameLst>
+                                          <p:attrName>style.visibility</p:attrName>
+                                        </p:attrNameLst>
+                                      </p:cBhvr>
+                                      <p:to>
+                                        <p:strVal val="visible"/>
+                                      </p:to>
+                                    </p:set>
+                                    <p:animEffect transition="in" filter="randombar(horizontal)">
+                                      <p:cBhvr>
+                                        <p:cTn id="41" dur="500"/>
+                                        <p:tgtEl>
+                                          <p:spTgt spid="8"/>
+                                        </p:tgtEl>
+                                      </p:cBhvr>
+                                    </p:animEffect>
+                                  </p:childTnLst>
+                                </p:cTn>
+                              </p:par>
+                            </p:childTnLst>
+                          </p:cTn>
+                        </p:par>
+                      </p:childTnLst>
+                    </p:cTn>
+                  </p:par>
+                  <p:par>
+                    <p:cTn id="42" fill="hold">
+                      <p:stCondLst>
+                        <p:cond delay="indefinite"/>
+                      </p:stCondLst>
+                      <p:childTnLst>
+                        <p:par>
+                          <p:cTn id="43" fill="hold">
+                            <p:stCondLst>
+                              <p:cond delay="0"/>
+                            </p:stCondLst>
+                            <p:childTnLst>
+                              <p:par>
+                                <p:cTn id="44" presetID="53" presetClass="entr" presetSubtype="16" fill="hold" grpId="0" nodeType="clickEffect">
+                                  <p:stCondLst>
+                                    <p:cond delay="0"/>
+                                  </p:stCondLst>
+                                  <p:childTnLst>
+                                    <p:set>
+                                      <p:cBhvr>
+                                        <p:cTn id="45" dur="1" fill="hold">
+                                          <p:stCondLst>
+                                            <p:cond delay="0"/>
+                                          </p:stCondLst>
+                                        </p:cTn>
+                                        <p:tgtEl>
+                                          <p:spTgt spid="10"/>
+                                        </p:tgtEl>
+                                        <p:attrNameLst>
+                                          <p:attrName>style.visibility</p:attrName>
+                                        </p:attrNameLst>
+                                      </p:cBhvr>
+                                      <p:to>
+                                        <p:strVal val="visible"/>
+                                      </p:to>
+                                    </p:set>
+                                    <p:anim calcmode="lin" valueType="num">
+                                      <p:cBhvr>
+                                        <p:cTn id="46" dur="500" fill="hold"/>
+                                        <p:tgtEl>
+                                          <p:spTgt spid="10"/>
+                                        </p:tgtEl>
+                                        <p:attrNameLst>
+                                          <p:attrName>ppt_w</p:attrName>
+                                        </p:attrNameLst>
+                                      </p:cBhvr>
+                                      <p:tavLst>
+                                        <p:tav tm="0">
+                                          <p:val>
+                                            <p:fltVal val="0"/>
+                                          </p:val>
+                                        </p:tav>
+                                        <p:tav tm="100000">
+                                          <p:val>
+                                            <p:strVal val="#ppt_w"/>
+                                          </p:val>
+                                        </p:tav>
+                                      </p:tavLst>
+                                    </p:anim>
+                                    <p:anim calcmode="lin" valueType="num">
+                                      <p:cBhvr>
+                                        <p:cTn id="47" dur="500" fill="hold"/>
+                                        <p:tgtEl>
+                                          <p:spTgt spid="10"/>
+                                        </p:tgtEl>
+                                        <p:attrNameLst>
+                                          <p:attrName>ppt_h</p:attrName>
+                                        </p:attrNameLst>
+                                      </p:cBhvr>
+                                      <p:tavLst>
+                                        <p:tav tm="0">
+                                          <p:val>
+                                            <p:fltVal val="0"/>
+                                          </p:val>
+                                        </p:tav>
+                                        <p:tav tm="100000">
+                                          <p:val>
+                                            <p:strVal val="#ppt_h"/>
+                                          </p:val>
+                                        </p:tav>
+                                      </p:tavLst>
+                                    </p:anim>
+                                    <p:animEffect transition="in" filter="fade">
+                                      <p:cBhvr>
+                                        <p:cTn id="48" dur="500"/>
+                                        <p:tgtEl>
+                                          <p:spTgt spid="10"/>
+                                        </p:tgtEl>
+                                      </p:cBhvr>
+                                    </p:animEffect>
+                                  </p:childTnLst>
+                                </p:cTn>
+                              </p:par>
+                            </p:childTnLst>
+                          </p:cTn>
+                        </p:par>
+                      </p:childTnLst>
+                    </p:cTn>
+                  </p:par>
+                </p:childTnLst>
+              </p:cTn>
+              <p:prevCondLst>
+                <p:cond evt="onPrev" delay="0">
+                  <p:tgtEl>
+                    <p:sldTgt/>
+                  </p:tgtEl>
+                </p:cond>
+              </p:prevCondLst>
+              <p:nextCondLst>
+                <p:cond evt="onNext" delay="0">
+                  <p:tgtEl>
+                    <p:sldTgt/>
+                  </p:tgtEl>
+                </p:cond>
+              </p:nextCondLst>
+            </p:seq>
+            <p:audio>
+              <p:cMediaNode vol="80000" showWhenStopped="0">
+                <p:cTn id="49" fill="hold" display="0">
+                  <p:stCondLst>
+                    <p:cond delay="indefinite"/>
+                  </p:stCondLst>
+                  <p:endCondLst>
+                    <p:cond evt="onStopAudio" delay="0">
+                      <p:tgtEl>
+                        <p:sldTgt/>
+                      </p:tgtEl>
+                    </p:cond>
+                  </p:endCondLst>
+                </p:cTn>
+                <p:tgtEl>
+                  <p:spTgt spid="6"/>
+                </p:tgtEl>
+              </p:cMediaNode>
+            </p:audio>
+            <p:audio>
+              <p:cMediaNode vol="80000" showWhenStopped="0">
+                <p:cTn id="50" fill="hold" display="0">
+                  <p:stCondLst>
+                    <p:cond delay="indefinite"/>
+                  </p:stCondLst>
+                  <p:endCondLst>
+                    <p:cond evt="onStopAudio" delay="0">
+                      <p:tgtEl>
+                        <p:sldTgt/>
+                      </p:tgtEl>
+                    </p:cond>
+                  </p:endCondLst>
+                </p:cTn>
+                <p:tgtEl>
+                  <p:spTgt spid="7"/>
+                </p:tgtEl>
+              </p:cMediaNode>
+            </p:audio>
+          </p:childTnLst>
+        </p:cTn>
+      </p:par>
+    </p:tnLst>
+    <p:bldLst>
+      <p:bldP spid="4" grpId="0" animBg="1"/>
+      <p:bldP spid="5" grpId="0" animBg="1"/>
+      <p:bldP spid="8" grpId="0" animBg="1"/>
+      <p:bldP spid="10" grpId="0" animBg="1"/>
+      <p:bldP spid="12" grpId="0" animBg="1"/>
+      <p:bldP spid="13" grpId="0" animBg="1"/>
+    </p:bldLst>
+  </p:timing>
 </p:sld>
 </file>
 

</xml_diff>